<commit_message>
Updated diagrams in powerpoint
</commit_message>
<xml_diff>
--- a/docs/diagrams/Diagrams.pptx
+++ b/docs/diagrams/Diagrams.pptx
@@ -115,6 +115,22 @@
       </a:defRPr>
     </a:lvl9pPr>
   </p:defaultTextStyle>
+  <p:extLst>
+    <p:ext uri="{EFAFB233-063F-42B5-8137-9DF3F51BA10A}">
+      <p15:sldGuideLst xmlns:p15="http://schemas.microsoft.com/office/powerpoint/2012/main">
+        <p15:guide id="1" orient="horz" pos="1488">
+          <p15:clr>
+            <a:srgbClr val="A4A3A4"/>
+          </p15:clr>
+        </p15:guide>
+        <p15:guide id="2" pos="2880">
+          <p15:clr>
+            <a:srgbClr val="A4A3A4"/>
+          </p15:clr>
+        </p15:guide>
+      </p15:sldGuideLst>
+    </p:ext>
+  </p:extLst>
 </p:presentation>
 </file>
 
@@ -200,7 +216,7 @@
           <a:p>
             <a:fld id="{F5CC4B3F-88C1-4FFA-B1B6-F41C21DC6924}" type="datetimeFigureOut">
               <a:rPr lang="en-US" smtClean="0"/>
-              <a:t>9/30/2016</a:t>
+              <a:t>10/20/2016</a:t>
             </a:fld>
             <a:endParaRPr lang="en-US"/>
           </a:p>
@@ -264,38 +280,37 @@
           <a:p>
             <a:pPr lvl="0"/>
             <a:r>
-              <a:rPr lang="en-US" smtClean="0"/>
+              <a:rPr lang="en-US"/>
               <a:t>Click to edit Master text styles</a:t>
             </a:r>
           </a:p>
           <a:p>
             <a:pPr lvl="1"/>
             <a:r>
-              <a:rPr lang="en-US" smtClean="0"/>
+              <a:rPr lang="en-US"/>
               <a:t>Second level</a:t>
             </a:r>
           </a:p>
           <a:p>
             <a:pPr lvl="2"/>
             <a:r>
-              <a:rPr lang="en-US" smtClean="0"/>
+              <a:rPr lang="en-US"/>
               <a:t>Third level</a:t>
             </a:r>
           </a:p>
           <a:p>
             <a:pPr lvl="3"/>
             <a:r>
-              <a:rPr lang="en-US" smtClean="0"/>
+              <a:rPr lang="en-US"/>
               <a:t>Fourth level</a:t>
             </a:r>
           </a:p>
           <a:p>
             <a:pPr lvl="4"/>
             <a:r>
-              <a:rPr lang="en-US" smtClean="0"/>
+              <a:rPr lang="en-US"/>
               <a:t>Fifth level</a:t>
             </a:r>
-            <a:endParaRPr lang="en-US"/>
           </a:p>
         </p:txBody>
       </p:sp>
@@ -506,10 +521,9 @@
           <a:lstStyle/>
           <a:p>
             <a:r>
-              <a:rPr lang="en-US" smtClean="0"/>
+              <a:rPr lang="en-US"/>
               <a:t>Click to edit Master title style</a:t>
             </a:r>
-            <a:endParaRPr lang="en-US"/>
           </a:p>
         </p:txBody>
       </p:sp>
@@ -625,10 +639,9 @@
           </a:lstStyle>
           <a:p>
             <a:r>
-              <a:rPr lang="en-US" smtClean="0"/>
+              <a:rPr lang="en-US"/>
               <a:t>Click to edit Master subtitle style</a:t>
             </a:r>
-            <a:endParaRPr lang="en-US"/>
           </a:p>
         </p:txBody>
       </p:sp>
@@ -649,7 +662,7 @@
           <a:p>
             <a:fld id="{78C97017-6FC3-485B-9764-EAC9E56C1D49}" type="datetimeFigureOut">
               <a:rPr lang="en-US" smtClean="0"/>
-              <a:t>9/30/2016</a:t>
+              <a:t>10/20/2016</a:t>
             </a:fld>
             <a:endParaRPr lang="en-US"/>
           </a:p>
@@ -743,10 +756,9 @@
           <a:lstStyle/>
           <a:p>
             <a:r>
-              <a:rPr lang="en-US" smtClean="0"/>
+              <a:rPr lang="en-US"/>
               <a:t>Click to edit Master title style</a:t>
             </a:r>
-            <a:endParaRPr lang="en-US"/>
           </a:p>
         </p:txBody>
       </p:sp>
@@ -767,38 +779,37 @@
           <a:p>
             <a:pPr lvl="0"/>
             <a:r>
-              <a:rPr lang="en-US" smtClean="0"/>
+              <a:rPr lang="en-US"/>
               <a:t>Click to edit Master text styles</a:t>
             </a:r>
           </a:p>
           <a:p>
             <a:pPr lvl="1"/>
             <a:r>
-              <a:rPr lang="en-US" smtClean="0"/>
+              <a:rPr lang="en-US"/>
               <a:t>Second level</a:t>
             </a:r>
           </a:p>
           <a:p>
             <a:pPr lvl="2"/>
             <a:r>
-              <a:rPr lang="en-US" smtClean="0"/>
+              <a:rPr lang="en-US"/>
               <a:t>Third level</a:t>
             </a:r>
           </a:p>
           <a:p>
             <a:pPr lvl="3"/>
             <a:r>
-              <a:rPr lang="en-US" smtClean="0"/>
+              <a:rPr lang="en-US"/>
               <a:t>Fourth level</a:t>
             </a:r>
           </a:p>
           <a:p>
             <a:pPr lvl="4"/>
             <a:r>
-              <a:rPr lang="en-US" smtClean="0"/>
+              <a:rPr lang="en-US"/>
               <a:t>Fifth level</a:t>
             </a:r>
-            <a:endParaRPr lang="en-US"/>
           </a:p>
         </p:txBody>
       </p:sp>
@@ -819,7 +830,7 @@
           <a:p>
             <a:fld id="{78C97017-6FC3-485B-9764-EAC9E56C1D49}" type="datetimeFigureOut">
               <a:rPr lang="en-US" smtClean="0"/>
-              <a:t>9/30/2016</a:t>
+              <a:t>10/20/2016</a:t>
             </a:fld>
             <a:endParaRPr lang="en-US"/>
           </a:p>
@@ -918,10 +929,9 @@
           <a:lstStyle/>
           <a:p>
             <a:r>
-              <a:rPr lang="en-US" smtClean="0"/>
+              <a:rPr lang="en-US"/>
               <a:t>Click to edit Master title style</a:t>
             </a:r>
-            <a:endParaRPr lang="en-US"/>
           </a:p>
         </p:txBody>
       </p:sp>
@@ -947,38 +957,37 @@
           <a:p>
             <a:pPr lvl="0"/>
             <a:r>
-              <a:rPr lang="en-US" smtClean="0"/>
+              <a:rPr lang="en-US"/>
               <a:t>Click to edit Master text styles</a:t>
             </a:r>
           </a:p>
           <a:p>
             <a:pPr lvl="1"/>
             <a:r>
-              <a:rPr lang="en-US" smtClean="0"/>
+              <a:rPr lang="en-US"/>
               <a:t>Second level</a:t>
             </a:r>
           </a:p>
           <a:p>
             <a:pPr lvl="2"/>
             <a:r>
-              <a:rPr lang="en-US" smtClean="0"/>
+              <a:rPr lang="en-US"/>
               <a:t>Third level</a:t>
             </a:r>
           </a:p>
           <a:p>
             <a:pPr lvl="3"/>
             <a:r>
-              <a:rPr lang="en-US" smtClean="0"/>
+              <a:rPr lang="en-US"/>
               <a:t>Fourth level</a:t>
             </a:r>
           </a:p>
           <a:p>
             <a:pPr lvl="4"/>
             <a:r>
-              <a:rPr lang="en-US" smtClean="0"/>
+              <a:rPr lang="en-US"/>
               <a:t>Fifth level</a:t>
             </a:r>
-            <a:endParaRPr lang="en-US"/>
           </a:p>
         </p:txBody>
       </p:sp>
@@ -999,7 +1008,7 @@
           <a:p>
             <a:fld id="{78C97017-6FC3-485B-9764-EAC9E56C1D49}" type="datetimeFigureOut">
               <a:rPr lang="en-US" smtClean="0"/>
-              <a:t>9/30/2016</a:t>
+              <a:t>10/20/2016</a:t>
             </a:fld>
             <a:endParaRPr lang="en-US"/>
           </a:p>
@@ -1093,10 +1102,9 @@
           <a:lstStyle/>
           <a:p>
             <a:r>
-              <a:rPr lang="en-US" smtClean="0"/>
+              <a:rPr lang="en-US"/>
               <a:t>Click to edit Master title style</a:t>
             </a:r>
-            <a:endParaRPr lang="en-US"/>
           </a:p>
         </p:txBody>
       </p:sp>
@@ -1117,38 +1125,37 @@
           <a:p>
             <a:pPr lvl="0"/>
             <a:r>
-              <a:rPr lang="en-US" smtClean="0"/>
+              <a:rPr lang="en-US"/>
               <a:t>Click to edit Master text styles</a:t>
             </a:r>
           </a:p>
           <a:p>
             <a:pPr lvl="1"/>
             <a:r>
-              <a:rPr lang="en-US" smtClean="0"/>
+              <a:rPr lang="en-US"/>
               <a:t>Second level</a:t>
             </a:r>
           </a:p>
           <a:p>
             <a:pPr lvl="2"/>
             <a:r>
-              <a:rPr lang="en-US" smtClean="0"/>
+              <a:rPr lang="en-US"/>
               <a:t>Third level</a:t>
             </a:r>
           </a:p>
           <a:p>
             <a:pPr lvl="3"/>
             <a:r>
-              <a:rPr lang="en-US" smtClean="0"/>
+              <a:rPr lang="en-US"/>
               <a:t>Fourth level</a:t>
             </a:r>
           </a:p>
           <a:p>
             <a:pPr lvl="4"/>
             <a:r>
-              <a:rPr lang="en-US" smtClean="0"/>
+              <a:rPr lang="en-US"/>
               <a:t>Fifth level</a:t>
             </a:r>
-            <a:endParaRPr lang="en-US"/>
           </a:p>
         </p:txBody>
       </p:sp>
@@ -1169,7 +1176,7 @@
           <a:p>
             <a:fld id="{78C97017-6FC3-485B-9764-EAC9E56C1D49}" type="datetimeFigureOut">
               <a:rPr lang="en-US" smtClean="0"/>
-              <a:t>9/30/2016</a:t>
+              <a:t>10/20/2016</a:t>
             </a:fld>
             <a:endParaRPr lang="en-US"/>
           </a:p>
@@ -1272,10 +1279,9 @@
           </a:lstStyle>
           <a:p>
             <a:r>
-              <a:rPr lang="en-US" smtClean="0"/>
+              <a:rPr lang="en-US"/>
               <a:t>Click to edit Master title style</a:t>
             </a:r>
-            <a:endParaRPr lang="en-US"/>
           </a:p>
         </p:txBody>
       </p:sp>
@@ -1392,7 +1398,7 @@
           <a:p>
             <a:pPr lvl="0"/>
             <a:r>
-              <a:rPr lang="en-US" smtClean="0"/>
+              <a:rPr lang="en-US"/>
               <a:t>Click to edit Master text styles</a:t>
             </a:r>
           </a:p>
@@ -1415,7 +1421,7 @@
           <a:p>
             <a:fld id="{78C97017-6FC3-485B-9764-EAC9E56C1D49}" type="datetimeFigureOut">
               <a:rPr lang="en-US" smtClean="0"/>
-              <a:t>9/30/2016</a:t>
+              <a:t>10/20/2016</a:t>
             </a:fld>
             <a:endParaRPr lang="en-US"/>
           </a:p>
@@ -1509,10 +1515,9 @@
           <a:lstStyle/>
           <a:p>
             <a:r>
-              <a:rPr lang="en-US" smtClean="0"/>
+              <a:rPr lang="en-US"/>
               <a:t>Click to edit Master title style</a:t>
             </a:r>
-            <a:endParaRPr lang="en-US"/>
           </a:p>
         </p:txBody>
       </p:sp>
@@ -1566,38 +1571,37 @@
           <a:p>
             <a:pPr lvl="0"/>
             <a:r>
-              <a:rPr lang="en-US" smtClean="0"/>
+              <a:rPr lang="en-US"/>
               <a:t>Click to edit Master text styles</a:t>
             </a:r>
           </a:p>
           <a:p>
             <a:pPr lvl="1"/>
             <a:r>
-              <a:rPr lang="en-US" smtClean="0"/>
+              <a:rPr lang="en-US"/>
               <a:t>Second level</a:t>
             </a:r>
           </a:p>
           <a:p>
             <a:pPr lvl="2"/>
             <a:r>
-              <a:rPr lang="en-US" smtClean="0"/>
+              <a:rPr lang="en-US"/>
               <a:t>Third level</a:t>
             </a:r>
           </a:p>
           <a:p>
             <a:pPr lvl="3"/>
             <a:r>
-              <a:rPr lang="en-US" smtClean="0"/>
+              <a:rPr lang="en-US"/>
               <a:t>Fourth level</a:t>
             </a:r>
           </a:p>
           <a:p>
             <a:pPr lvl="4"/>
             <a:r>
-              <a:rPr lang="en-US" smtClean="0"/>
+              <a:rPr lang="en-US"/>
               <a:t>Fifth level</a:t>
             </a:r>
-            <a:endParaRPr lang="en-US"/>
           </a:p>
         </p:txBody>
       </p:sp>
@@ -1651,38 +1655,37 @@
           <a:p>
             <a:pPr lvl="0"/>
             <a:r>
-              <a:rPr lang="en-US" smtClean="0"/>
+              <a:rPr lang="en-US"/>
               <a:t>Click to edit Master text styles</a:t>
             </a:r>
           </a:p>
           <a:p>
             <a:pPr lvl="1"/>
             <a:r>
-              <a:rPr lang="en-US" smtClean="0"/>
+              <a:rPr lang="en-US"/>
               <a:t>Second level</a:t>
             </a:r>
           </a:p>
           <a:p>
             <a:pPr lvl="2"/>
             <a:r>
-              <a:rPr lang="en-US" smtClean="0"/>
+              <a:rPr lang="en-US"/>
               <a:t>Third level</a:t>
             </a:r>
           </a:p>
           <a:p>
             <a:pPr lvl="3"/>
             <a:r>
-              <a:rPr lang="en-US" smtClean="0"/>
+              <a:rPr lang="en-US"/>
               <a:t>Fourth level</a:t>
             </a:r>
           </a:p>
           <a:p>
             <a:pPr lvl="4"/>
             <a:r>
-              <a:rPr lang="en-US" smtClean="0"/>
+              <a:rPr lang="en-US"/>
               <a:t>Fifth level</a:t>
             </a:r>
-            <a:endParaRPr lang="en-US"/>
           </a:p>
         </p:txBody>
       </p:sp>
@@ -1703,7 +1706,7 @@
           <a:p>
             <a:fld id="{78C97017-6FC3-485B-9764-EAC9E56C1D49}" type="datetimeFigureOut">
               <a:rPr lang="en-US" smtClean="0"/>
-              <a:t>9/30/2016</a:t>
+              <a:t>10/20/2016</a:t>
             </a:fld>
             <a:endParaRPr lang="en-US"/>
           </a:p>
@@ -1801,10 +1804,9 @@
           </a:lstStyle>
           <a:p>
             <a:r>
-              <a:rPr lang="en-US" smtClean="0"/>
+              <a:rPr lang="en-US"/>
               <a:t>Click to edit Master title style</a:t>
             </a:r>
-            <a:endParaRPr lang="en-US"/>
           </a:p>
         </p:txBody>
       </p:sp>
@@ -1867,7 +1869,7 @@
           <a:p>
             <a:pPr lvl="0"/>
             <a:r>
-              <a:rPr lang="en-US" smtClean="0"/>
+              <a:rPr lang="en-US"/>
               <a:t>Click to edit Master text styles</a:t>
             </a:r>
           </a:p>
@@ -1923,38 +1925,37 @@
           <a:p>
             <a:pPr lvl="0"/>
             <a:r>
-              <a:rPr lang="en-US" smtClean="0"/>
+              <a:rPr lang="en-US"/>
               <a:t>Click to edit Master text styles</a:t>
             </a:r>
           </a:p>
           <a:p>
             <a:pPr lvl="1"/>
             <a:r>
-              <a:rPr lang="en-US" smtClean="0"/>
+              <a:rPr lang="en-US"/>
               <a:t>Second level</a:t>
             </a:r>
           </a:p>
           <a:p>
             <a:pPr lvl="2"/>
             <a:r>
-              <a:rPr lang="en-US" smtClean="0"/>
+              <a:rPr lang="en-US"/>
               <a:t>Third level</a:t>
             </a:r>
           </a:p>
           <a:p>
             <a:pPr lvl="3"/>
             <a:r>
-              <a:rPr lang="en-US" smtClean="0"/>
+              <a:rPr lang="en-US"/>
               <a:t>Fourth level</a:t>
             </a:r>
           </a:p>
           <a:p>
             <a:pPr lvl="4"/>
             <a:r>
-              <a:rPr lang="en-US" smtClean="0"/>
+              <a:rPr lang="en-US"/>
               <a:t>Fifth level</a:t>
             </a:r>
-            <a:endParaRPr lang="en-US"/>
           </a:p>
         </p:txBody>
       </p:sp>
@@ -2017,7 +2018,7 @@
           <a:p>
             <a:pPr lvl="0"/>
             <a:r>
-              <a:rPr lang="en-US" smtClean="0"/>
+              <a:rPr lang="en-US"/>
               <a:t>Click to edit Master text styles</a:t>
             </a:r>
           </a:p>
@@ -2073,38 +2074,37 @@
           <a:p>
             <a:pPr lvl="0"/>
             <a:r>
-              <a:rPr lang="en-US" smtClean="0"/>
+              <a:rPr lang="en-US"/>
               <a:t>Click to edit Master text styles</a:t>
             </a:r>
           </a:p>
           <a:p>
             <a:pPr lvl="1"/>
             <a:r>
-              <a:rPr lang="en-US" smtClean="0"/>
+              <a:rPr lang="en-US"/>
               <a:t>Second level</a:t>
             </a:r>
           </a:p>
           <a:p>
             <a:pPr lvl="2"/>
             <a:r>
-              <a:rPr lang="en-US" smtClean="0"/>
+              <a:rPr lang="en-US"/>
               <a:t>Third level</a:t>
             </a:r>
           </a:p>
           <a:p>
             <a:pPr lvl="3"/>
             <a:r>
-              <a:rPr lang="en-US" smtClean="0"/>
+              <a:rPr lang="en-US"/>
               <a:t>Fourth level</a:t>
             </a:r>
           </a:p>
           <a:p>
             <a:pPr lvl="4"/>
             <a:r>
-              <a:rPr lang="en-US" smtClean="0"/>
+              <a:rPr lang="en-US"/>
               <a:t>Fifth level</a:t>
             </a:r>
-            <a:endParaRPr lang="en-US"/>
           </a:p>
         </p:txBody>
       </p:sp>
@@ -2125,7 +2125,7 @@
           <a:p>
             <a:fld id="{78C97017-6FC3-485B-9764-EAC9E56C1D49}" type="datetimeFigureOut">
               <a:rPr lang="en-US" smtClean="0"/>
-              <a:t>9/30/2016</a:t>
+              <a:t>10/20/2016</a:t>
             </a:fld>
             <a:endParaRPr lang="en-US"/>
           </a:p>
@@ -2219,10 +2219,9 @@
           <a:lstStyle/>
           <a:p>
             <a:r>
-              <a:rPr lang="en-US" smtClean="0"/>
+              <a:rPr lang="en-US"/>
               <a:t>Click to edit Master title style</a:t>
             </a:r>
-            <a:endParaRPr lang="en-US"/>
           </a:p>
         </p:txBody>
       </p:sp>
@@ -2243,7 +2242,7 @@
           <a:p>
             <a:fld id="{78C97017-6FC3-485B-9764-EAC9E56C1D49}" type="datetimeFigureOut">
               <a:rPr lang="en-US" smtClean="0"/>
-              <a:t>9/30/2016</a:t>
+              <a:t>10/20/2016</a:t>
             </a:fld>
             <a:endParaRPr lang="en-US"/>
           </a:p>
@@ -2338,7 +2337,7 @@
           <a:p>
             <a:fld id="{78C97017-6FC3-485B-9764-EAC9E56C1D49}" type="datetimeFigureOut">
               <a:rPr lang="en-US" smtClean="0"/>
-              <a:t>9/30/2016</a:t>
+              <a:t>10/20/2016</a:t>
             </a:fld>
             <a:endParaRPr lang="en-US"/>
           </a:p>
@@ -2441,10 +2440,9 @@
           </a:lstStyle>
           <a:p>
             <a:r>
-              <a:rPr lang="en-US" smtClean="0"/>
+              <a:rPr lang="en-US"/>
               <a:t>Click to edit Master title style</a:t>
             </a:r>
-            <a:endParaRPr lang="en-US"/>
           </a:p>
         </p:txBody>
       </p:sp>
@@ -2498,38 +2496,37 @@
           <a:p>
             <a:pPr lvl="0"/>
             <a:r>
-              <a:rPr lang="en-US" smtClean="0"/>
+              <a:rPr lang="en-US"/>
               <a:t>Click to edit Master text styles</a:t>
             </a:r>
           </a:p>
           <a:p>
             <a:pPr lvl="1"/>
             <a:r>
-              <a:rPr lang="en-US" smtClean="0"/>
+              <a:rPr lang="en-US"/>
               <a:t>Second level</a:t>
             </a:r>
           </a:p>
           <a:p>
             <a:pPr lvl="2"/>
             <a:r>
-              <a:rPr lang="en-US" smtClean="0"/>
+              <a:rPr lang="en-US"/>
               <a:t>Third level</a:t>
             </a:r>
           </a:p>
           <a:p>
             <a:pPr lvl="3"/>
             <a:r>
-              <a:rPr lang="en-US" smtClean="0"/>
+              <a:rPr lang="en-US"/>
               <a:t>Fourth level</a:t>
             </a:r>
           </a:p>
           <a:p>
             <a:pPr lvl="4"/>
             <a:r>
-              <a:rPr lang="en-US" smtClean="0"/>
+              <a:rPr lang="en-US"/>
               <a:t>Fifth level</a:t>
             </a:r>
-            <a:endParaRPr lang="en-US"/>
           </a:p>
         </p:txBody>
       </p:sp>
@@ -2592,7 +2589,7 @@
           <a:p>
             <a:pPr lvl="0"/>
             <a:r>
-              <a:rPr lang="en-US" smtClean="0"/>
+              <a:rPr lang="en-US"/>
               <a:t>Click to edit Master text styles</a:t>
             </a:r>
           </a:p>
@@ -2615,7 +2612,7 @@
           <a:p>
             <a:fld id="{78C97017-6FC3-485B-9764-EAC9E56C1D49}" type="datetimeFigureOut">
               <a:rPr lang="en-US" smtClean="0"/>
-              <a:t>9/30/2016</a:t>
+              <a:t>10/20/2016</a:t>
             </a:fld>
             <a:endParaRPr lang="en-US"/>
           </a:p>
@@ -2718,10 +2715,9 @@
           </a:lstStyle>
           <a:p>
             <a:r>
-              <a:rPr lang="en-US" smtClean="0"/>
+              <a:rPr lang="en-US"/>
               <a:t>Click to edit Master title style</a:t>
             </a:r>
-            <a:endParaRPr lang="en-US"/>
           </a:p>
         </p:txBody>
       </p:sp>
@@ -2845,7 +2841,7 @@
           <a:p>
             <a:pPr lvl="0"/>
             <a:r>
-              <a:rPr lang="en-US" smtClean="0"/>
+              <a:rPr lang="en-US"/>
               <a:t>Click to edit Master text styles</a:t>
             </a:r>
           </a:p>
@@ -2868,7 +2864,7 @@
           <a:p>
             <a:fld id="{78C97017-6FC3-485B-9764-EAC9E56C1D49}" type="datetimeFigureOut">
               <a:rPr lang="en-US" smtClean="0"/>
-              <a:t>9/30/2016</a:t>
+              <a:t>10/20/2016</a:t>
             </a:fld>
             <a:endParaRPr lang="en-US"/>
           </a:p>
@@ -2977,10 +2973,9 @@
           <a:lstStyle/>
           <a:p>
             <a:r>
-              <a:rPr lang="en-US" smtClean="0"/>
+              <a:rPr lang="en-US"/>
               <a:t>Click to edit Master title style</a:t>
             </a:r>
-            <a:endParaRPr lang="en-US"/>
           </a:p>
         </p:txBody>
       </p:sp>
@@ -3011,38 +3006,37 @@
           <a:p>
             <a:pPr lvl="0"/>
             <a:r>
-              <a:rPr lang="en-US" smtClean="0"/>
+              <a:rPr lang="en-US"/>
               <a:t>Click to edit Master text styles</a:t>
             </a:r>
           </a:p>
           <a:p>
             <a:pPr lvl="1"/>
             <a:r>
-              <a:rPr lang="en-US" smtClean="0"/>
+              <a:rPr lang="en-US"/>
               <a:t>Second level</a:t>
             </a:r>
           </a:p>
           <a:p>
             <a:pPr lvl="2"/>
             <a:r>
-              <a:rPr lang="en-US" smtClean="0"/>
+              <a:rPr lang="en-US"/>
               <a:t>Third level</a:t>
             </a:r>
           </a:p>
           <a:p>
             <a:pPr lvl="3"/>
             <a:r>
-              <a:rPr lang="en-US" smtClean="0"/>
+              <a:rPr lang="en-US"/>
               <a:t>Fourth level</a:t>
             </a:r>
           </a:p>
           <a:p>
             <a:pPr lvl="4"/>
             <a:r>
-              <a:rPr lang="en-US" smtClean="0"/>
+              <a:rPr lang="en-US"/>
               <a:t>Fifth level</a:t>
             </a:r>
-            <a:endParaRPr lang="en-US"/>
           </a:p>
         </p:txBody>
       </p:sp>
@@ -3081,7 +3075,7 @@
           <a:p>
             <a:fld id="{78C97017-6FC3-485B-9764-EAC9E56C1D49}" type="datetimeFigureOut">
               <a:rPr lang="en-US" smtClean="0"/>
-              <a:t>9/30/2016</a:t>
+              <a:t>10/20/2016</a:t>
             </a:fld>
             <a:endParaRPr lang="en-US"/>
           </a:p>
@@ -3472,14 +3466,13 @@
           <a:lstStyle/>
           <a:p>
             <a:r>
-              <a:rPr lang="en-US" dirty="0" err="1" smtClean="0"/>
+              <a:rPr lang="en-US" dirty="0" err="1"/>
               <a:t>AddressBook</a:t>
             </a:r>
             <a:r>
-              <a:rPr lang="en-US" dirty="0" smtClean="0"/>
+              <a:rPr lang="en-US" dirty="0"/>
               <a:t> – Level 4</a:t>
             </a:r>
-            <a:endParaRPr lang="en-US" dirty="0"/>
           </a:p>
         </p:txBody>
       </p:sp>
@@ -3499,10 +3492,9 @@
           <a:lstStyle/>
           <a:p>
             <a:r>
-              <a:rPr lang="en-US" dirty="0" smtClean="0"/>
+              <a:rPr lang="en-US" dirty="0"/>
               <a:t>Diagrams</a:t>
             </a:r>
-            <a:endParaRPr lang="en-US" dirty="0"/>
           </a:p>
         </p:txBody>
       </p:sp>
@@ -3634,7 +3626,7 @@
           <a:p>
             <a:pPr algn="ctr"/>
             <a:r>
-              <a:rPr lang="en-US" sz="1600" dirty="0" smtClean="0">
+              <a:rPr lang="en-US" sz="1600" dirty="0">
                 <a:solidFill>
                   <a:schemeClr val="bg1"/>
                 </a:solidFill>
@@ -3693,7 +3685,7 @@
           <a:p>
             <a:pPr algn="ctr"/>
             <a:r>
-              <a:rPr lang="en-US" sz="1600" dirty="0" smtClean="0">
+              <a:rPr lang="en-US" sz="1600" dirty="0">
                 <a:solidFill>
                   <a:schemeClr val="bg1"/>
                 </a:solidFill>
@@ -3756,7 +3748,7 @@
           <a:p>
             <a:pPr algn="ctr"/>
             <a:r>
-              <a:rPr lang="en-US" sz="1600" dirty="0" smtClean="0">
+              <a:rPr lang="en-US" sz="1600" dirty="0">
                 <a:solidFill>
                   <a:schemeClr val="bg1"/>
                 </a:solidFill>
@@ -3815,7 +3807,7 @@
           <a:p>
             <a:pPr algn="ctr"/>
             <a:r>
-              <a:rPr lang="en-US" sz="1600" dirty="0" smtClean="0">
+              <a:rPr lang="en-US" sz="1600" dirty="0">
                 <a:solidFill>
                   <a:schemeClr val="bg1"/>
                 </a:solidFill>
@@ -4401,7 +4393,7 @@
           <a:p>
             <a:pPr algn="ctr"/>
             <a:r>
-              <a:rPr lang="en-US" sz="1600" dirty="0" smtClean="0">
+              <a:rPr lang="en-US" sz="1600" dirty="0">
                 <a:solidFill>
                   <a:schemeClr val="bg1"/>
                 </a:solidFill>
@@ -4752,7 +4744,7 @@
           <a:p>
             <a:pPr algn="ctr"/>
             <a:r>
-              <a:rPr lang="en-US" sz="1600" dirty="0" smtClean="0">
+              <a:rPr lang="en-US" sz="1600" dirty="0">
                 <a:solidFill>
                   <a:schemeClr val="bg1"/>
                 </a:solidFill>
@@ -4760,25 +4752,20 @@
               <a:t>Logs</a:t>
             </a:r>
             <a:br>
-              <a:rPr lang="en-US" sz="1600" dirty="0" smtClean="0">
+              <a:rPr lang="en-US" sz="1600" dirty="0">
                 <a:solidFill>
                   <a:schemeClr val="bg1"/>
                 </a:solidFill>
               </a:rPr>
             </a:br>
             <a:r>
-              <a:rPr lang="en-US" sz="1600" dirty="0" smtClean="0">
+              <a:rPr lang="en-US" sz="1600" dirty="0">
                 <a:solidFill>
                   <a:schemeClr val="bg1"/>
                 </a:solidFill>
               </a:rPr>
               <a:t>Center</a:t>
             </a:r>
-            <a:endParaRPr lang="en-US" sz="1600" dirty="0">
-              <a:solidFill>
-                <a:schemeClr val="bg1"/>
-              </a:solidFill>
-            </a:endParaRPr>
           </a:p>
         </p:txBody>
       </p:sp>
@@ -4935,7 +4922,7 @@
           <a:p>
             <a:pPr algn="ctr"/>
             <a:r>
-              <a:rPr lang="en-US" sz="1600" dirty="0" smtClean="0">
+              <a:rPr lang="en-US" sz="1600" dirty="0">
                 <a:solidFill>
                   <a:schemeClr val="bg1"/>
                 </a:solidFill>
@@ -5299,7 +5286,7 @@
           <a:p>
             <a:pPr algn="ctr"/>
             <a:r>
-              <a:rPr lang="en-US" sz="1600" dirty="0" smtClean="0">
+              <a:rPr lang="en-US" sz="1600" dirty="0">
                 <a:solidFill>
                   <a:schemeClr val="bg1"/>
                 </a:solidFill>
@@ -5446,7 +5433,7 @@
           <a:p>
             <a:pPr algn="ctr"/>
             <a:r>
-              <a:rPr lang="en-US" sz="1600" dirty="0" smtClean="0">
+              <a:rPr lang="en-US" sz="1600" dirty="0">
                 <a:solidFill>
                   <a:schemeClr val="bg1"/>
                 </a:solidFill>
@@ -5608,10 +5595,9 @@
           <a:lstStyle/>
           <a:p>
             <a:r>
-              <a:rPr lang="en-US" sz="1400" dirty="0" smtClean="0"/>
+              <a:rPr lang="en-US" sz="1400" dirty="0"/>
               <a:t>delete 1</a:t>
             </a:r>
-            <a:endParaRPr lang="en-US" sz="1400" dirty="0"/>
           </a:p>
         </p:txBody>
       </p:sp>
@@ -5674,18 +5660,13 @@
           <a:lstStyle/>
           <a:p>
             <a:r>
-              <a:rPr lang="en-US" sz="1400" dirty="0" smtClean="0">
+              <a:rPr lang="en-US" sz="1400" dirty="0">
                 <a:solidFill>
                   <a:srgbClr val="0070C0"/>
                 </a:solidFill>
               </a:rPr>
               <a:t>execute(“delete 1”)</a:t>
             </a:r>
-            <a:endParaRPr lang="en-US" sz="1400" dirty="0">
-              <a:solidFill>
-                <a:srgbClr val="0070C0"/>
-              </a:solidFill>
-            </a:endParaRPr>
           </a:p>
         </p:txBody>
       </p:sp>
@@ -5748,7 +5729,7 @@
           <a:lstStyle/>
           <a:p>
             <a:r>
-              <a:rPr lang="en-US" sz="1400" dirty="0" err="1" smtClean="0">
+              <a:rPr lang="en-US" sz="1400" dirty="0" err="1">
                 <a:solidFill>
                   <a:srgbClr val="7030A0"/>
                 </a:solidFill>
@@ -5756,18 +5737,13 @@
               <a:t>deletePerson</a:t>
             </a:r>
             <a:r>
-              <a:rPr lang="en-US" sz="1400" dirty="0" smtClean="0">
+              <a:rPr lang="en-US" sz="1400" dirty="0">
                 <a:solidFill>
                   <a:srgbClr val="7030A0"/>
                 </a:solidFill>
               </a:rPr>
               <a:t>(p)</a:t>
             </a:r>
-            <a:endParaRPr lang="en-US" sz="1400" dirty="0">
-              <a:solidFill>
-                <a:srgbClr val="7030A0"/>
-              </a:solidFill>
-            </a:endParaRPr>
           </a:p>
         </p:txBody>
       </p:sp>
@@ -5794,7 +5770,7 @@
           <a:lstStyle/>
           <a:p>
             <a:r>
-              <a:rPr lang="en-US" sz="1400" dirty="0" smtClean="0">
+              <a:rPr lang="en-US" sz="1400" dirty="0">
                 <a:solidFill>
                   <a:schemeClr val="accent5">
                     <a:lumMod val="75000"/>
@@ -5804,17 +5780,17 @@
               <a:t>post(</a:t>
             </a:r>
             <a:r>
-              <a:rPr lang="en-US" sz="1400" dirty="0" err="1" smtClean="0">
+              <a:rPr lang="en-US" sz="1400" dirty="0" err="1">
                 <a:solidFill>
                   <a:schemeClr val="accent5">
                     <a:lumMod val="75000"/>
                   </a:schemeClr>
                 </a:solidFill>
               </a:rPr>
-              <a:t>AddressBookChangedEvent</a:t>
-            </a:r>
-            <a:r>
-              <a:rPr lang="en-US" sz="1400" dirty="0" smtClean="0">
+              <a:t>TaskListChangedEvent</a:t>
+            </a:r>
+            <a:r>
+              <a:rPr lang="en-US" sz="1400" dirty="0">
                 <a:solidFill>
                   <a:schemeClr val="accent5">
                     <a:lumMod val="75000"/>
@@ -5823,13 +5799,6 @@
               </a:rPr>
               <a:t>)</a:t>
             </a:r>
-            <a:endParaRPr lang="en-US" sz="1400" dirty="0">
-              <a:solidFill>
-                <a:schemeClr val="accent5">
-                  <a:lumMod val="75000"/>
-                </a:schemeClr>
-              </a:solidFill>
-            </a:endParaRPr>
           </a:p>
         </p:txBody>
       </p:sp>
@@ -5995,7 +5964,7 @@
           <a:p>
             <a:pPr algn="ctr"/>
             <a:r>
-              <a:rPr lang="en-US" sz="1600" dirty="0" smtClean="0">
+              <a:rPr lang="en-US" sz="1600" dirty="0">
                 <a:solidFill>
                   <a:schemeClr val="bg1"/>
                 </a:solidFill>
@@ -6003,7 +5972,7 @@
               <a:t>:</a:t>
             </a:r>
             <a:r>
-              <a:rPr lang="en-US" sz="1600" dirty="0" err="1" smtClean="0">
+              <a:rPr lang="en-US" sz="1600" dirty="0" err="1">
                 <a:solidFill>
                   <a:schemeClr val="bg1"/>
                 </a:solidFill>
@@ -6236,7 +6205,7 @@
           <a:p>
             <a:pPr algn="ctr"/>
             <a:r>
-              <a:rPr lang="en-US" sz="1600" dirty="0" smtClean="0">
+              <a:rPr lang="en-US" sz="1600" dirty="0">
                 <a:solidFill>
                   <a:schemeClr val="bg1"/>
                 </a:solidFill>
@@ -6368,7 +6337,7 @@
           <a:lstStyle/>
           <a:p>
             <a:r>
-              <a:rPr lang="en-US" sz="1400" dirty="0" smtClean="0">
+              <a:rPr lang="en-US" sz="1400" dirty="0">
                 <a:solidFill>
                   <a:schemeClr val="accent5">
                     <a:lumMod val="75000"/>
@@ -6378,17 +6347,17 @@
               <a:t>post(</a:t>
             </a:r>
             <a:r>
-              <a:rPr lang="en-US" sz="1400" dirty="0" err="1" smtClean="0">
+              <a:rPr lang="en-US" sz="1400" dirty="0" err="1">
                 <a:solidFill>
                   <a:schemeClr val="accent5">
                     <a:lumMod val="75000"/>
                   </a:schemeClr>
                 </a:solidFill>
               </a:rPr>
-              <a:t>AddressBookChangedEvent</a:t>
-            </a:r>
-            <a:r>
-              <a:rPr lang="en-US" sz="1400" dirty="0" smtClean="0">
+              <a:t>TaskListChangedEvent</a:t>
+            </a:r>
+            <a:r>
+              <a:rPr lang="en-US" sz="1400" dirty="0">
                 <a:solidFill>
                   <a:schemeClr val="accent5">
                     <a:lumMod val="75000"/>
@@ -6397,13 +6366,6 @@
               </a:rPr>
               <a:t>)</a:t>
             </a:r>
-            <a:endParaRPr lang="en-US" sz="1400" dirty="0">
-              <a:solidFill>
-                <a:schemeClr val="accent5">
-                  <a:lumMod val="75000"/>
-                </a:schemeClr>
-              </a:solidFill>
-            </a:endParaRPr>
           </a:p>
         </p:txBody>
       </p:sp>
@@ -6495,7 +6457,7 @@
           <a:p>
             <a:pPr algn="ctr"/>
             <a:r>
-              <a:rPr lang="en-US" sz="1600" dirty="0" smtClean="0">
+              <a:rPr lang="en-US" sz="1600" dirty="0">
                 <a:solidFill>
                   <a:schemeClr val="bg1"/>
                 </a:solidFill>
@@ -6503,7 +6465,7 @@
               <a:t>:</a:t>
             </a:r>
             <a:r>
-              <a:rPr lang="en-US" sz="1600" dirty="0" err="1" smtClean="0">
+              <a:rPr lang="en-US" sz="1600" dirty="0" err="1">
                 <a:solidFill>
                   <a:schemeClr val="bg1"/>
                 </a:solidFill>
@@ -6750,17 +6712,17 @@
           <a:lstStyle/>
           <a:p>
             <a:r>
-              <a:rPr lang="en-US" sz="1400" dirty="0" err="1" smtClean="0">
+              <a:rPr lang="en-US" sz="1400" dirty="0" err="1">
                 <a:solidFill>
                   <a:schemeClr val="accent6">
                     <a:lumMod val="75000"/>
                   </a:schemeClr>
                 </a:solidFill>
               </a:rPr>
-              <a:t>handleAddresssBookChangedEvent</a:t>
-            </a:r>
-            <a:r>
-              <a:rPr lang="en-US" sz="1400" dirty="0" smtClean="0">
+              <a:t>handleTaskListChangedEvent</a:t>
+            </a:r>
+            <a:r>
+              <a:rPr lang="en-US" sz="1400" dirty="0">
                 <a:solidFill>
                   <a:schemeClr val="accent6">
                     <a:lumMod val="75000"/>
@@ -6769,13 +6731,6 @@
               </a:rPr>
               <a:t>()</a:t>
             </a:r>
-            <a:endParaRPr lang="en-US" sz="1400" dirty="0">
-              <a:solidFill>
-                <a:schemeClr val="accent6">
-                  <a:lumMod val="75000"/>
-                </a:schemeClr>
-              </a:solidFill>
-            </a:endParaRPr>
           </a:p>
         </p:txBody>
       </p:sp>
@@ -6860,7 +6815,7 @@
           <a:p>
             <a:pPr algn="ctr"/>
             <a:r>
-              <a:rPr lang="en-US" sz="1600" dirty="0" smtClean="0">
+              <a:rPr lang="en-US" sz="1600" dirty="0">
                 <a:solidFill>
                   <a:schemeClr val="bg1"/>
                 </a:solidFill>
@@ -7063,26 +7018,21 @@
           <a:lstStyle/>
           <a:p>
             <a:r>
-              <a:rPr lang="en-US" sz="1400" dirty="0" err="1" smtClean="0">
+              <a:rPr lang="en-US" sz="1400" dirty="0" err="1">
                 <a:solidFill>
                   <a:srgbClr val="00B050"/>
                 </a:solidFill>
               </a:rPr>
-              <a:t>handleAddresssBookChangedEvent</a:t>
-            </a:r>
-            <a:r>
-              <a:rPr lang="en-US" sz="1400" dirty="0" smtClean="0">
+              <a:t>handleTaskListChangedEvent</a:t>
+            </a:r>
+            <a:r>
+              <a:rPr lang="en-US" sz="1400" dirty="0">
                 <a:solidFill>
                   <a:srgbClr val="00B050"/>
                 </a:solidFill>
               </a:rPr>
               <a:t>()</a:t>
             </a:r>
-            <a:endParaRPr lang="en-US" sz="1400" dirty="0">
-              <a:solidFill>
-                <a:srgbClr val="00B050"/>
-              </a:solidFill>
-            </a:endParaRPr>
           </a:p>
         </p:txBody>
       </p:sp>
@@ -7269,18 +7219,13 @@
           <a:p>
             <a:pPr algn="r"/>
             <a:r>
-              <a:rPr lang="en-US" sz="1400" dirty="0" smtClean="0">
+              <a:rPr lang="en-US" sz="1400" dirty="0">
                 <a:solidFill>
                   <a:srgbClr val="00B050"/>
                 </a:solidFill>
               </a:rPr>
               <a:t>Update status bar</a:t>
             </a:r>
-            <a:endParaRPr lang="en-US" sz="1400" dirty="0">
-              <a:solidFill>
-                <a:srgbClr val="00B050"/>
-              </a:solidFill>
-            </a:endParaRPr>
           </a:p>
         </p:txBody>
       </p:sp>
@@ -7470,7 +7415,7 @@
           <a:lstStyle/>
           <a:p>
             <a:r>
-              <a:rPr lang="en-US" sz="1400" dirty="0" smtClean="0">
+              <a:rPr lang="en-US" sz="1400" dirty="0">
                 <a:solidFill>
                   <a:schemeClr val="accent6">
                     <a:lumMod val="75000"/>
@@ -7480,7 +7425,7 @@
               <a:t>Save </a:t>
             </a:r>
             <a:br>
-              <a:rPr lang="en-US" sz="1400" dirty="0" smtClean="0">
+              <a:rPr lang="en-US" sz="1400" dirty="0">
                 <a:solidFill>
                   <a:schemeClr val="accent6">
                     <a:lumMod val="75000"/>
@@ -7489,7 +7434,7 @@
               </a:rPr>
             </a:br>
             <a:r>
-              <a:rPr lang="en-US" sz="1400" dirty="0" smtClean="0">
+              <a:rPr lang="en-US" sz="1400" dirty="0">
                 <a:solidFill>
                   <a:schemeClr val="accent6">
                     <a:lumMod val="75000"/>
@@ -7498,13 +7443,6 @@
               </a:rPr>
               <a:t>to file</a:t>
             </a:r>
-            <a:endParaRPr lang="en-US" sz="1400" dirty="0">
-              <a:solidFill>
-                <a:schemeClr val="accent6">
-                  <a:lumMod val="75000"/>
-                </a:schemeClr>
-              </a:solidFill>
-            </a:endParaRPr>
           </a:p>
         </p:txBody>
       </p:sp>
@@ -7581,7 +7519,7 @@
           <a:lstStyle/>
           <a:p>
             <a:r>
-              <a:rPr lang="en-US" sz="1200" b="1" dirty="0" smtClean="0">
+              <a:rPr lang="en-US" sz="1200" b="1" dirty="0">
                 <a:solidFill>
                   <a:schemeClr val="accent3">
                     <a:lumMod val="75000"/>
@@ -7764,7 +7702,7 @@
           <a:p>
             <a:pPr algn="ctr"/>
             <a:r>
-              <a:rPr lang="en-US" sz="1050" dirty="0" err="1" smtClean="0">
+              <a:rPr lang="en-US" sz="1050" dirty="0" err="1">
                 <a:solidFill>
                   <a:schemeClr val="bg1"/>
                 </a:solidFill>
@@ -8141,7 +8079,7 @@
                   </a:schemeClr>
                 </a:solidFill>
               </a:rPr>
-              <a:t>PersonListPanel</a:t>
+              <a:t>TaskListPanel</a:t>
             </a:r>
             <a:endParaRPr lang="en-SG" sz="1050" b="1" dirty="0">
               <a:solidFill>
@@ -8201,7 +8139,7 @@
                   </a:schemeClr>
                 </a:solidFill>
               </a:rPr>
-              <a:t>PersonCard</a:t>
+              <a:t>TaskCard</a:t>
             </a:r>
             <a:endParaRPr lang="en-SG" sz="1050" b="1" dirty="0">
               <a:solidFill>
@@ -8626,7 +8564,7 @@
           <a:p>
             <a:pPr algn="ctr"/>
             <a:r>
-              <a:rPr lang="en-US" sz="1050" b="1" dirty="0" smtClean="0">
+              <a:rPr lang="en-US" sz="1050" b="1" dirty="0">
                 <a:solidFill>
                   <a:schemeClr val="accent3">
                     <a:lumMod val="75000"/>
@@ -8636,7 +8574,7 @@
               <a:t>{abstract}</a:t>
             </a:r>
             <a:br>
-              <a:rPr lang="en-US" sz="1050" b="1" dirty="0" smtClean="0">
+              <a:rPr lang="en-US" sz="1050" b="1" dirty="0">
                 <a:solidFill>
                   <a:schemeClr val="accent3">
                     <a:lumMod val="75000"/>
@@ -8645,7 +8583,7 @@
               </a:rPr>
             </a:br>
             <a:r>
-              <a:rPr lang="en-US" sz="1050" b="1" dirty="0" err="1" smtClean="0">
+              <a:rPr lang="en-US" sz="1050" b="1" dirty="0" err="1">
                 <a:solidFill>
                   <a:schemeClr val="accent3">
                     <a:lumMod val="75000"/>
@@ -9134,7 +9072,7 @@
           <a:p>
             <a:pPr algn="ctr"/>
             <a:r>
-              <a:rPr lang="en-US" sz="1100" b="1" dirty="0" smtClean="0">
+              <a:rPr lang="en-US" sz="1100" b="1" dirty="0">
                 <a:solidFill>
                   <a:schemeClr val="bg1"/>
                 </a:solidFill>
@@ -9193,7 +9131,7 @@
           <a:p>
             <a:pPr algn="ctr"/>
             <a:r>
-              <a:rPr lang="en-US" sz="1050" dirty="0" smtClean="0">
+              <a:rPr lang="en-US" sz="1050" dirty="0">
                 <a:solidFill>
                   <a:schemeClr val="bg1"/>
                 </a:solidFill>
@@ -9204,7 +9142,7 @@
           <a:p>
             <a:pPr algn="ctr"/>
             <a:r>
-              <a:rPr lang="en-US" sz="1050" dirty="0" err="1" smtClean="0">
+              <a:rPr lang="en-US" sz="1050" dirty="0" err="1">
                 <a:solidFill>
                   <a:schemeClr val="bg1"/>
                 </a:solidFill>
@@ -9753,13 +9691,6 @@
   <p:clrMapOvr>
     <a:masterClrMapping/>
   </p:clrMapOvr>
-  <p:timing>
-    <p:tnLst>
-      <p:par>
-        <p:cTn id="1" dur="indefinite" restart="never" nodeType="tmRoot"/>
-      </p:par>
-    </p:tnLst>
-  </p:timing>
 </p:sld>
 </file>
 
@@ -9826,7 +9757,7 @@
           <a:lstStyle/>
           <a:p>
             <a:r>
-              <a:rPr lang="en-US" sz="1200" b="1" dirty="0" smtClean="0">
+              <a:rPr lang="en-US" sz="1200" b="1" dirty="0">
                 <a:solidFill>
                   <a:srgbClr val="0070C0"/>
                 </a:solidFill>
@@ -10000,7 +9931,7 @@
           <a:p>
             <a:pPr algn="ctr"/>
             <a:r>
-              <a:rPr lang="en-US" sz="1050" dirty="0" err="1" smtClean="0">
+              <a:rPr lang="en-US" sz="1050" dirty="0" err="1">
                 <a:solidFill>
                   <a:schemeClr val="bg1"/>
                 </a:solidFill>
@@ -10362,7 +10293,7 @@
           <a:p>
             <a:pPr algn="ctr"/>
             <a:r>
-              <a:rPr lang="en-US" sz="1050" b="1" dirty="0" smtClean="0">
+              <a:rPr lang="en-US" sz="1050" b="1" dirty="0">
                 <a:solidFill>
                   <a:srgbClr val="0070C0"/>
                 </a:solidFill>
@@ -10370,14 +10301,14 @@
               <a:t>{abstract}</a:t>
             </a:r>
             <a:br>
-              <a:rPr lang="en-US" sz="1050" b="1" dirty="0" smtClean="0">
+              <a:rPr lang="en-US" sz="1050" b="1" dirty="0">
                 <a:solidFill>
                   <a:srgbClr val="0070C0"/>
                 </a:solidFill>
               </a:rPr>
             </a:br>
             <a:r>
-              <a:rPr lang="en-US" sz="1050" b="1" dirty="0" smtClean="0">
+              <a:rPr lang="en-US" sz="1050" b="1" dirty="0">
                 <a:solidFill>
                   <a:srgbClr val="0070C0"/>
                 </a:solidFill>
@@ -11038,7 +10969,7 @@
             <a:p>
               <a:pPr algn="r"/>
               <a:r>
-                <a:rPr lang="en-US" sz="1100" dirty="0" smtClean="0">
+                <a:rPr lang="en-US" sz="1100" dirty="0">
                   <a:solidFill>
                     <a:srgbClr val="0070C0"/>
                   </a:solidFill>
@@ -11137,7 +11068,7 @@
             <a:lstStyle/>
             <a:p>
               <a:r>
-                <a:rPr lang="en-US" sz="1100" dirty="0" smtClean="0">
+                <a:rPr lang="en-US" sz="1100" dirty="0">
                   <a:solidFill>
                     <a:srgbClr val="0070C0"/>
                   </a:solidFill>
@@ -11223,7 +11154,7 @@
           <a:p>
             <a:pPr algn="r"/>
             <a:r>
-              <a:rPr lang="en-US" sz="1100" dirty="0" smtClean="0">
+              <a:rPr lang="en-US" sz="1100" dirty="0">
                 <a:solidFill>
                   <a:srgbClr val="0070C0"/>
                 </a:solidFill>
@@ -11262,7 +11193,7 @@
           <a:p>
             <a:pPr algn="r"/>
             <a:r>
-              <a:rPr lang="en-US" sz="1100" dirty="0" smtClean="0">
+              <a:rPr lang="en-US" sz="1100" dirty="0">
                 <a:solidFill>
                   <a:srgbClr val="0070C0"/>
                 </a:solidFill>
@@ -11315,7 +11246,7 @@
             <a:p>
               <a:pPr algn="r"/>
               <a:r>
-                <a:rPr lang="en-US" sz="1100" dirty="0" smtClean="0">
+                <a:rPr lang="en-US" sz="1100" dirty="0">
                   <a:solidFill>
                     <a:srgbClr val="0070C0"/>
                   </a:solidFill>
@@ -11418,7 +11349,7 @@
           <a:p>
             <a:pPr algn="ctr"/>
             <a:r>
-              <a:rPr lang="en-US" sz="1050" b="1" dirty="0" smtClean="0">
+              <a:rPr lang="en-US" sz="1050" b="1" dirty="0">
                 <a:solidFill>
                   <a:srgbClr val="0070C0"/>
                 </a:solidFill>
@@ -11426,14 +11357,14 @@
               <a:t>Incorrect</a:t>
             </a:r>
             <a:br>
-              <a:rPr lang="en-US" sz="1050" b="1" dirty="0" smtClean="0">
+              <a:rPr lang="en-US" sz="1050" b="1" dirty="0">
                 <a:solidFill>
                   <a:srgbClr val="0070C0"/>
                 </a:solidFill>
               </a:rPr>
             </a:br>
             <a:r>
-              <a:rPr lang="en-US" sz="1050" b="1" dirty="0" smtClean="0">
+              <a:rPr lang="en-US" sz="1050" b="1" dirty="0">
                 <a:solidFill>
                   <a:srgbClr val="0070C0"/>
                 </a:solidFill>
@@ -11542,13 +11473,6 @@
   <p:clrMapOvr>
     <a:masterClrMapping/>
   </p:clrMapOvr>
-  <p:timing>
-    <p:tnLst>
-      <p:par>
-        <p:cTn id="1" dur="indefinite" restart="never" nodeType="tmRoot"/>
-      </p:par>
-    </p:tnLst>
-  </p:timing>
 </p:sld>
 </file>
 
@@ -11615,7 +11539,7 @@
           <a:lstStyle/>
           <a:p>
             <a:r>
-              <a:rPr lang="en-US" sz="1200" b="1" dirty="0" smtClean="0">
+              <a:rPr lang="en-US" sz="1200" b="1" dirty="0">
                 <a:solidFill>
                   <a:srgbClr val="0070C0"/>
                 </a:solidFill>
@@ -11825,7 +11749,7 @@
           <a:p>
             <a:pPr algn="ctr"/>
             <a:r>
-              <a:rPr lang="en-US" sz="1600" dirty="0" smtClean="0">
+              <a:rPr lang="en-US" sz="1600" dirty="0">
                 <a:solidFill>
                   <a:schemeClr val="bg1"/>
                 </a:solidFill>
@@ -11972,20 +11896,12 @@
           <a:p>
             <a:pPr algn="ctr"/>
             <a:r>
-              <a:rPr lang="en-US" sz="1600" dirty="0" smtClean="0">
+              <a:rPr lang="en-US" sz="1600" dirty="0">
                 <a:solidFill>
                   <a:schemeClr val="bg1"/>
                 </a:solidFill>
               </a:rPr>
               <a:t>d:Delete</a:t>
-            </a:r>
-            <a:r>
-              <a:rPr lang="en-US" sz="1600" dirty="0">
-                <a:solidFill>
-                  <a:schemeClr val="bg1"/>
-                </a:solidFill>
-              </a:rPr>
-              <a:t/>
             </a:r>
             <a:br>
               <a:rPr lang="en-US" sz="1600" dirty="0">
@@ -12190,18 +12106,13 @@
           <a:p>
             <a:pPr algn="r"/>
             <a:r>
-              <a:rPr lang="en-US" sz="1400" dirty="0" smtClean="0">
+              <a:rPr lang="en-US" sz="1400" dirty="0">
                 <a:solidFill>
                   <a:srgbClr val="0070C0"/>
                 </a:solidFill>
               </a:rPr>
               <a:t>execute(“delete 1”)</a:t>
             </a:r>
-            <a:endParaRPr lang="en-US" sz="1400" dirty="0">
-              <a:solidFill>
-                <a:srgbClr val="0070C0"/>
-              </a:solidFill>
-            </a:endParaRPr>
           </a:p>
         </p:txBody>
       </p:sp>
@@ -12280,7 +12191,6 @@
               <a:rPr lang="en-US" dirty="0"/>
               <a:t>execute()</a:t>
             </a:r>
-            <a:endParaRPr lang="en-US" dirty="0"/>
           </a:p>
         </p:txBody>
       </p:sp>
@@ -12792,26 +12702,21 @@
           </a:lstStyle>
           <a:p>
             <a:r>
-              <a:rPr lang="en-US" dirty="0" err="1" smtClean="0">
+              <a:rPr lang="en-US" dirty="0" err="1">
                 <a:solidFill>
                   <a:srgbClr val="7030A0"/>
                 </a:solidFill>
               </a:rPr>
-              <a:t>deletePerson</a:t>
-            </a:r>
-            <a:r>
-              <a:rPr lang="en-US" dirty="0" smtClean="0">
+              <a:t>deleteTask</a:t>
+            </a:r>
+            <a:r>
+              <a:rPr lang="en-US" dirty="0">
                 <a:solidFill>
                   <a:srgbClr val="7030A0"/>
                 </a:solidFill>
               </a:rPr>
               <a:t>(p)</a:t>
             </a:r>
-            <a:endParaRPr lang="en-US" dirty="0">
-              <a:solidFill>
-                <a:srgbClr val="7030A0"/>
-              </a:solidFill>
-            </a:endParaRPr>
           </a:p>
         </p:txBody>
       </p:sp>
@@ -12849,10 +12754,9 @@
           </a:lstStyle>
           <a:p>
             <a:r>
-              <a:rPr lang="en-US" dirty="0" smtClean="0"/>
+              <a:rPr lang="en-US" dirty="0"/>
               <a:t>create()</a:t>
             </a:r>
-            <a:endParaRPr lang="en-US" dirty="0"/>
           </a:p>
         </p:txBody>
       </p:sp>
@@ -12890,10 +12794,9 @@
           </a:lstStyle>
           <a:p>
             <a:r>
-              <a:rPr lang="en-US" dirty="0" smtClean="0"/>
+              <a:rPr lang="en-US" dirty="0"/>
               <a:t>parse(“delete 1”)</a:t>
             </a:r>
-            <a:endParaRPr lang="en-US" dirty="0"/>
           </a:p>
         </p:txBody>
       </p:sp>
@@ -12931,10 +12834,9 @@
           </a:lstStyle>
           <a:p>
             <a:r>
-              <a:rPr lang="en-US" dirty="0" smtClean="0"/>
+              <a:rPr lang="en-US" dirty="0"/>
               <a:t>result</a:t>
             </a:r>
-            <a:endParaRPr lang="en-US" dirty="0"/>
           </a:p>
         </p:txBody>
       </p:sp>
@@ -12972,10 +12874,9 @@
           </a:lstStyle>
           <a:p>
             <a:r>
-              <a:rPr lang="en-US" dirty="0" smtClean="0"/>
+              <a:rPr lang="en-US" dirty="0"/>
               <a:t>result</a:t>
             </a:r>
-            <a:endParaRPr lang="en-US" dirty="0"/>
           </a:p>
         </p:txBody>
       </p:sp>
@@ -13023,7 +12924,7 @@
           <a:p>
             <a:pPr algn="ctr"/>
             <a:r>
-              <a:rPr lang="en-US" sz="1600" dirty="0" smtClean="0">
+              <a:rPr lang="en-US" sz="1600" dirty="0">
                 <a:solidFill>
                   <a:schemeClr val="bg1"/>
                 </a:solidFill>
@@ -13031,14 +12932,14 @@
               <a:t>result:</a:t>
             </a:r>
             <a:br>
-              <a:rPr lang="en-US" sz="1600" dirty="0" smtClean="0">
+              <a:rPr lang="en-US" sz="1600" dirty="0">
                 <a:solidFill>
                   <a:schemeClr val="bg1"/>
                 </a:solidFill>
               </a:rPr>
             </a:br>
             <a:r>
-              <a:rPr lang="en-US" sz="1600" dirty="0" err="1" smtClean="0">
+              <a:rPr lang="en-US" sz="1600" dirty="0" err="1">
                 <a:solidFill>
                   <a:schemeClr val="bg1"/>
                 </a:solidFill>
@@ -13208,10 +13109,9 @@
           </a:lstStyle>
           <a:p>
             <a:r>
-              <a:rPr lang="en-US" dirty="0" smtClean="0"/>
+              <a:rPr lang="en-US" dirty="0"/>
               <a:t>d</a:t>
             </a:r>
-            <a:endParaRPr lang="en-US" dirty="0"/>
           </a:p>
         </p:txBody>
       </p:sp>
@@ -13291,7 +13191,7 @@
           <a:lstStyle/>
           <a:p>
             <a:r>
-              <a:rPr lang="en-US" sz="1200" b="1" dirty="0" smtClean="0">
+              <a:rPr lang="en-US" sz="1200" b="1" dirty="0">
                 <a:solidFill>
                   <a:srgbClr val="7030A0"/>
                 </a:solidFill>
@@ -13350,7 +13250,7 @@
           <a:p>
             <a:pPr algn="ctr"/>
             <a:r>
-              <a:rPr lang="en-US" sz="1050" dirty="0" err="1" smtClean="0">
+              <a:rPr lang="en-US" sz="1050" dirty="0" err="1">
                 <a:solidFill>
                   <a:schemeClr val="bg1"/>
                 </a:solidFill>
@@ -13409,7 +13309,7 @@
           <a:p>
             <a:pPr algn="ctr"/>
             <a:r>
-              <a:rPr lang="en-US" sz="1050" dirty="0" err="1" smtClean="0">
+              <a:rPr lang="en-US" sz="1050" dirty="0" err="1">
                 <a:solidFill>
                   <a:schemeClr val="bg1"/>
                 </a:solidFill>
@@ -13565,7 +13465,7 @@
           <a:p>
             <a:pPr algn="ctr"/>
             <a:r>
-              <a:rPr lang="en-US" sz="1050" dirty="0" smtClean="0">
+              <a:rPr lang="en-US" sz="1050" dirty="0">
                 <a:solidFill>
                   <a:schemeClr val="bg1"/>
                 </a:solidFill>
@@ -13931,12 +13831,12 @@
           <a:p>
             <a:pPr algn="ctr"/>
             <a:r>
-              <a:rPr lang="en-US" sz="1050" dirty="0" err="1" smtClean="0">
+              <a:rPr lang="en-US" sz="1050" dirty="0" err="1">
                 <a:solidFill>
                   <a:srgbClr val="7030A0"/>
                 </a:solidFill>
               </a:rPr>
-              <a:t>AddressBook</a:t>
+              <a:t>TaskList</a:t>
             </a:r>
             <a:endParaRPr lang="en-SG" sz="1050" dirty="0">
               <a:solidFill>
@@ -14073,7 +13973,7 @@
           <a:p>
             <a:pPr algn="ctr"/>
             <a:r>
-              <a:rPr lang="en-US" sz="1050" dirty="0" err="1" smtClean="0">
+              <a:rPr lang="en-US" sz="1050" dirty="0" err="1">
                 <a:solidFill>
                   <a:srgbClr val="7030A0"/>
                 </a:solidFill>
@@ -14217,7 +14117,7 @@
           <a:p>
             <a:pPr algn="ctr"/>
             <a:r>
-              <a:rPr lang="en-US" sz="1050" dirty="0" err="1" smtClean="0">
+              <a:rPr lang="en-US" sz="1050" dirty="0" err="1">
                 <a:solidFill>
                   <a:srgbClr val="7030A0"/>
                 </a:solidFill>
@@ -14316,7 +14216,7 @@
           <a:p>
             <a:pPr algn="ctr"/>
             <a:r>
-              <a:rPr lang="en-US" sz="1050" dirty="0" smtClean="0">
+              <a:rPr lang="en-US" sz="1050" dirty="0">
                 <a:solidFill>
                   <a:srgbClr val="7030A0"/>
                 </a:solidFill>
@@ -14458,7 +14358,7 @@
           <a:p>
             <a:pPr algn="ctr"/>
             <a:r>
-              <a:rPr lang="en-US" sz="1050" dirty="0" smtClean="0">
+              <a:rPr lang="en-US" sz="1050" dirty="0">
                 <a:solidFill>
                   <a:srgbClr val="7030A0"/>
                 </a:solidFill>
@@ -14600,7 +14500,7 @@
           <a:p>
             <a:pPr algn="ctr"/>
             <a:r>
-              <a:rPr lang="en-US" sz="1050" dirty="0" smtClean="0">
+              <a:rPr lang="en-US" sz="1050" dirty="0">
                 <a:solidFill>
                   <a:srgbClr val="7030A0"/>
                 </a:solidFill>
@@ -14608,14 +14508,14 @@
               <a:t>&lt;&lt;interface&gt;&gt;</a:t>
             </a:r>
             <a:br>
-              <a:rPr lang="en-US" sz="1050" dirty="0" smtClean="0">
+              <a:rPr lang="en-US" sz="1050" dirty="0">
                 <a:solidFill>
                   <a:srgbClr val="7030A0"/>
                 </a:solidFill>
               </a:rPr>
             </a:br>
             <a:r>
-              <a:rPr lang="en-US" sz="1050" dirty="0" err="1" smtClean="0">
+              <a:rPr lang="en-US" sz="1050" dirty="0" err="1">
                 <a:solidFill>
                   <a:srgbClr val="7030A0"/>
                 </a:solidFill>
@@ -14671,7 +14571,7 @@
           <a:p>
             <a:pPr algn="ctr"/>
             <a:r>
-              <a:rPr lang="en-US" sz="1050" dirty="0" smtClean="0">
+              <a:rPr lang="en-US" sz="1050" dirty="0">
                 <a:solidFill>
                   <a:srgbClr val="7030A0"/>
                 </a:solidFill>
@@ -14815,7 +14715,7 @@
           <a:p>
             <a:pPr algn="ctr"/>
             <a:r>
-              <a:rPr lang="en-US" sz="1050" dirty="0" smtClean="0">
+              <a:rPr lang="en-US" sz="1050" dirty="0">
                 <a:solidFill>
                   <a:srgbClr val="7030A0"/>
                 </a:solidFill>
@@ -14912,7 +14812,7 @@
           <a:p>
             <a:pPr algn="ctr"/>
             <a:r>
-              <a:rPr lang="en-US" sz="1050" dirty="0" smtClean="0">
+              <a:rPr lang="en-US" sz="1050" dirty="0">
                 <a:solidFill>
                   <a:srgbClr val="7030A0"/>
                 </a:solidFill>
@@ -15009,7 +14909,7 @@
           <a:p>
             <a:pPr algn="ctr"/>
             <a:r>
-              <a:rPr lang="en-US" sz="1050" dirty="0" smtClean="0">
+              <a:rPr lang="en-US" sz="1050" dirty="0">
                 <a:solidFill>
                   <a:srgbClr val="7030A0"/>
                 </a:solidFill>
@@ -15197,130 +15097,12 @@
           <a:p>
             <a:pPr algn="ctr"/>
             <a:r>
-              <a:rPr lang="en-US" sz="1050" dirty="0" smtClean="0">
+              <a:rPr lang="en-US" sz="1050" dirty="0">
                 <a:solidFill>
                   <a:srgbClr val="7030A0"/>
                 </a:solidFill>
               </a:rPr>
               <a:t>&lt;&lt;interface&gt;&gt;</a:t>
-            </a:r>
-            <a:br>
-              <a:rPr lang="en-US" sz="1050" dirty="0" smtClean="0">
-                <a:solidFill>
-                  <a:srgbClr val="7030A0"/>
-                </a:solidFill>
-              </a:rPr>
-            </a:br>
-            <a:r>
-              <a:rPr lang="en-US" sz="1050" dirty="0" err="1" smtClean="0">
-                <a:solidFill>
-                  <a:srgbClr val="7030A0"/>
-                </a:solidFill>
-              </a:rPr>
-              <a:t>ReadOnlyAddressBook</a:t>
-            </a:r>
-            <a:endParaRPr lang="en-SG" sz="1050" dirty="0">
-              <a:solidFill>
-                <a:srgbClr val="7030A0"/>
-              </a:solidFill>
-            </a:endParaRPr>
-          </a:p>
-        </p:txBody>
-      </p:sp>
-      <p:sp>
-        <p:nvSpPr>
-          <p:cNvPr id="114" name="TextBox 113"/>
-          <p:cNvSpPr txBox="1"/>
-          <p:nvPr/>
-        </p:nvSpPr>
-        <p:spPr>
-          <a:xfrm rot="16200000">
-            <a:off x="6581354" y="3514530"/>
-            <a:ext cx="881018" cy="261610"/>
-          </a:xfrm>
-          <a:prstGeom prst="rect">
-            <a:avLst/>
-          </a:prstGeom>
-          <a:noFill/>
-        </p:spPr>
-        <p:txBody>
-          <a:bodyPr wrap="square" rtlCol="0">
-            <a:spAutoFit/>
-          </a:bodyPr>
-          <a:lstStyle/>
-          <a:p>
-            <a:pPr algn="r"/>
-            <a:r>
-              <a:rPr lang="en-US" sz="1100" dirty="0" smtClean="0">
-                <a:solidFill>
-                  <a:srgbClr val="7030A0"/>
-                </a:solidFill>
-              </a:rPr>
-              <a:t>filtered list</a:t>
-            </a:r>
-            <a:endParaRPr lang="en-SG" sz="1100" dirty="0">
-              <a:solidFill>
-                <a:srgbClr val="7030A0"/>
-              </a:solidFill>
-            </a:endParaRPr>
-          </a:p>
-        </p:txBody>
-      </p:sp>
-      <p:sp>
-        <p:nvSpPr>
-          <p:cNvPr id="122" name="Rectangle 8"/>
-          <p:cNvSpPr/>
-          <p:nvPr/>
-        </p:nvSpPr>
-        <p:spPr>
-          <a:xfrm>
-            <a:off x="2057400" y="4239491"/>
-            <a:ext cx="1775949" cy="346760"/>
-          </a:xfrm>
-          <a:prstGeom prst="rect">
-            <a:avLst/>
-          </a:prstGeom>
-          <a:ln w="19050">
-            <a:solidFill>
-              <a:srgbClr val="7030A0"/>
-            </a:solidFill>
-          </a:ln>
-          <a:effectLst/>
-        </p:spPr>
-        <p:style>
-          <a:lnRef idx="1">
-            <a:schemeClr val="accent4"/>
-          </a:lnRef>
-          <a:fillRef idx="2">
-            <a:schemeClr val="accent4"/>
-          </a:fillRef>
-          <a:effectRef idx="1">
-            <a:schemeClr val="accent4"/>
-          </a:effectRef>
-          <a:fontRef idx="minor">
-            <a:schemeClr val="dk1"/>
-          </a:fontRef>
-        </p:style>
-        <p:txBody>
-          <a:bodyPr rtlCol="0" anchor="ctr"/>
-          <a:lstStyle/>
-          <a:p>
-            <a:pPr algn="ctr"/>
-            <a:r>
-              <a:rPr lang="en-US" sz="1050" dirty="0" smtClean="0">
-                <a:solidFill>
-                  <a:srgbClr val="7030A0"/>
-                </a:solidFill>
-              </a:rPr>
-              <a:t>&lt;&lt;interface&gt;&gt;</a:t>
-            </a:r>
-            <a:r>
-              <a:rPr lang="en-US" sz="1050" dirty="0">
-                <a:solidFill>
-                  <a:srgbClr val="7030A0"/>
-                </a:solidFill>
-              </a:rPr>
-              <a:t/>
             </a:r>
             <a:br>
               <a:rPr lang="en-US" sz="1050" dirty="0">
@@ -15330,7 +15112,117 @@
               </a:rPr>
             </a:br>
             <a:r>
-              <a:rPr lang="en-US" sz="1050" dirty="0" err="1" smtClean="0">
+              <a:rPr lang="en-US" sz="1050" dirty="0" err="1">
+                <a:solidFill>
+                  <a:srgbClr val="7030A0"/>
+                </a:solidFill>
+              </a:rPr>
+              <a:t>ReadOnlyTaskList</a:t>
+            </a:r>
+            <a:endParaRPr lang="en-SG" sz="1050" dirty="0">
+              <a:solidFill>
+                <a:srgbClr val="7030A0"/>
+              </a:solidFill>
+            </a:endParaRPr>
+          </a:p>
+        </p:txBody>
+      </p:sp>
+      <p:sp>
+        <p:nvSpPr>
+          <p:cNvPr id="114" name="TextBox 113"/>
+          <p:cNvSpPr txBox="1"/>
+          <p:nvPr/>
+        </p:nvSpPr>
+        <p:spPr>
+          <a:xfrm rot="16200000">
+            <a:off x="6581354" y="3514530"/>
+            <a:ext cx="881018" cy="261610"/>
+          </a:xfrm>
+          <a:prstGeom prst="rect">
+            <a:avLst/>
+          </a:prstGeom>
+          <a:noFill/>
+        </p:spPr>
+        <p:txBody>
+          <a:bodyPr wrap="square" rtlCol="0">
+            <a:spAutoFit/>
+          </a:bodyPr>
+          <a:lstStyle/>
+          <a:p>
+            <a:pPr algn="r"/>
+            <a:r>
+              <a:rPr lang="en-US" sz="1100" dirty="0">
+                <a:solidFill>
+                  <a:srgbClr val="7030A0"/>
+                </a:solidFill>
+              </a:rPr>
+              <a:t>filtered list</a:t>
+            </a:r>
+            <a:endParaRPr lang="en-SG" sz="1100" dirty="0">
+              <a:solidFill>
+                <a:srgbClr val="7030A0"/>
+              </a:solidFill>
+            </a:endParaRPr>
+          </a:p>
+        </p:txBody>
+      </p:sp>
+      <p:sp>
+        <p:nvSpPr>
+          <p:cNvPr id="122" name="Rectangle 8"/>
+          <p:cNvSpPr/>
+          <p:nvPr/>
+        </p:nvSpPr>
+        <p:spPr>
+          <a:xfrm>
+            <a:off x="2057400" y="4239491"/>
+            <a:ext cx="1775949" cy="346760"/>
+          </a:xfrm>
+          <a:prstGeom prst="rect">
+            <a:avLst/>
+          </a:prstGeom>
+          <a:ln w="19050">
+            <a:solidFill>
+              <a:srgbClr val="7030A0"/>
+            </a:solidFill>
+          </a:ln>
+          <a:effectLst/>
+        </p:spPr>
+        <p:style>
+          <a:lnRef idx="1">
+            <a:schemeClr val="accent4"/>
+          </a:lnRef>
+          <a:fillRef idx="2">
+            <a:schemeClr val="accent4"/>
+          </a:fillRef>
+          <a:effectRef idx="1">
+            <a:schemeClr val="accent4"/>
+          </a:effectRef>
+          <a:fontRef idx="minor">
+            <a:schemeClr val="dk1"/>
+          </a:fontRef>
+        </p:style>
+        <p:txBody>
+          <a:bodyPr rtlCol="0" anchor="ctr"/>
+          <a:lstStyle/>
+          <a:p>
+            <a:pPr algn="ctr"/>
+            <a:r>
+              <a:rPr lang="en-US" sz="1050" dirty="0">
+                <a:solidFill>
+                  <a:srgbClr val="7030A0"/>
+                </a:solidFill>
+              </a:rPr>
+              <a:t>&lt;&lt;interface&gt;&gt;</a:t>
+            </a:r>
+            <a:br>
+              <a:rPr lang="en-US" sz="1050" dirty="0">
+                <a:solidFill>
+                  <a:srgbClr val="7030A0"/>
+                </a:solidFill>
+              </a:rPr>
+            </a:br>
+            <a:r>
+              <a:rPr lang="en-US" sz="1050" dirty="0" err="1">
                 <a:solidFill>
                   <a:srgbClr val="7030A0"/>
                 </a:solidFill>
@@ -15397,13 +15289,6 @@
   <p:clrMapOvr>
     <a:masterClrMapping/>
   </p:clrMapOvr>
-  <p:timing>
-    <p:tnLst>
-      <p:par>
-        <p:cTn id="1" dur="indefinite" restart="never" nodeType="tmRoot"/>
-      </p:par>
-    </p:tnLst>
-  </p:timing>
 </p:sld>
 </file>
 
@@ -15470,7 +15355,7 @@
           <a:lstStyle/>
           <a:p>
             <a:r>
-              <a:rPr lang="en-US" sz="1200" b="1" dirty="0" smtClean="0">
+              <a:rPr lang="en-US" sz="1200" b="1" dirty="0">
                 <a:solidFill>
                   <a:schemeClr val="accent6">
                     <a:lumMod val="75000"/>
@@ -15537,147 +15422,6 @@
           <a:p>
             <a:pPr algn="ctr"/>
             <a:r>
-              <a:rPr lang="en-US" sz="1050" dirty="0" smtClean="0">
-                <a:solidFill>
-                  <a:schemeClr val="bg1"/>
-                </a:solidFill>
-              </a:rPr>
-              <a:t>&lt;&lt;interface&gt;&gt;</a:t>
-            </a:r>
-            <a:br>
-              <a:rPr lang="en-US" sz="1050" dirty="0" smtClean="0">
-                <a:solidFill>
-                  <a:schemeClr val="bg1"/>
-                </a:solidFill>
-              </a:rPr>
-            </a:br>
-            <a:r>
-              <a:rPr lang="en-US" sz="1050" dirty="0" err="1" smtClean="0">
-                <a:solidFill>
-                  <a:schemeClr val="bg1"/>
-                </a:solidFill>
-              </a:rPr>
-              <a:t>AddressBookStorage</a:t>
-            </a:r>
-            <a:endParaRPr lang="en-SG" sz="1050" dirty="0">
-              <a:solidFill>
-                <a:schemeClr val="bg1"/>
-              </a:solidFill>
-            </a:endParaRPr>
-          </a:p>
-        </p:txBody>
-      </p:sp>
-      <p:sp>
-        <p:nvSpPr>
-          <p:cNvPr id="9" name="Rectangle 62"/>
-          <p:cNvSpPr/>
-          <p:nvPr/>
-        </p:nvSpPr>
-        <p:spPr>
-          <a:xfrm rot="16200000">
-            <a:off x="1683963" y="2868687"/>
-            <a:ext cx="1093635" cy="346760"/>
-          </a:xfrm>
-          <a:prstGeom prst="rect">
-            <a:avLst/>
-          </a:prstGeom>
-          <a:solidFill>
-            <a:schemeClr val="accent6">
-              <a:lumMod val="75000"/>
-            </a:schemeClr>
-          </a:solidFill>
-          <a:ln w="19050">
-            <a:solidFill>
-              <a:schemeClr val="accent6">
-                <a:lumMod val="75000"/>
-              </a:schemeClr>
-            </a:solidFill>
-          </a:ln>
-          <a:effectLst/>
-        </p:spPr>
-        <p:style>
-          <a:lnRef idx="1">
-            <a:schemeClr val="accent2"/>
-          </a:lnRef>
-          <a:fillRef idx="2">
-            <a:schemeClr val="accent2"/>
-          </a:fillRef>
-          <a:effectRef idx="1">
-            <a:schemeClr val="accent2"/>
-          </a:effectRef>
-          <a:fontRef idx="minor">
-            <a:schemeClr val="dk1"/>
-          </a:fontRef>
-        </p:style>
-        <p:txBody>
-          <a:bodyPr rtlCol="0" anchor="ctr"/>
-          <a:lstStyle/>
-          <a:p>
-            <a:pPr algn="ctr"/>
-            <a:r>
-              <a:rPr lang="en-US" sz="1050" dirty="0" err="1" smtClean="0">
-                <a:solidFill>
-                  <a:schemeClr val="bg1"/>
-                </a:solidFill>
-              </a:rPr>
-              <a:t>StorageManager</a:t>
-            </a:r>
-            <a:endParaRPr lang="en-SG" sz="1050" dirty="0">
-              <a:solidFill>
-                <a:schemeClr val="bg1"/>
-              </a:solidFill>
-            </a:endParaRPr>
-          </a:p>
-        </p:txBody>
-      </p:sp>
-      <p:sp>
-        <p:nvSpPr>
-          <p:cNvPr id="119" name="Rectangle 62"/>
-          <p:cNvSpPr/>
-          <p:nvPr/>
-        </p:nvSpPr>
-        <p:spPr>
-          <a:xfrm rot="16200000">
-            <a:off x="956202" y="2861202"/>
-            <a:ext cx="1093635" cy="346760"/>
-          </a:xfrm>
-          <a:prstGeom prst="rect">
-            <a:avLst/>
-          </a:prstGeom>
-          <a:solidFill>
-            <a:schemeClr val="accent6">
-              <a:lumMod val="75000"/>
-            </a:schemeClr>
-          </a:solidFill>
-          <a:ln w="19050">
-            <a:solidFill>
-              <a:schemeClr val="accent6">
-                <a:lumMod val="75000"/>
-              </a:schemeClr>
-            </a:solidFill>
-          </a:ln>
-          <a:effectLst/>
-        </p:spPr>
-        <p:style>
-          <a:lnRef idx="1">
-            <a:schemeClr val="accent2"/>
-          </a:lnRef>
-          <a:fillRef idx="2">
-            <a:schemeClr val="accent2"/>
-          </a:fillRef>
-          <a:effectRef idx="1">
-            <a:schemeClr val="accent2"/>
-          </a:effectRef>
-          <a:fontRef idx="minor">
-            <a:schemeClr val="dk1"/>
-          </a:fontRef>
-        </p:style>
-        <p:txBody>
-          <a:bodyPr rtlCol="0" anchor="ctr"/>
-          <a:lstStyle/>
-          <a:p>
-            <a:pPr algn="ctr"/>
-            <a:r>
               <a:rPr lang="en-US" sz="1050" dirty="0">
                 <a:solidFill>
                   <a:schemeClr val="bg1"/>
@@ -15685,11 +15429,152 @@
               </a:rPr>
               <a:t>&lt;&lt;interface&gt;&gt;</a:t>
             </a:r>
-          </a:p>
+            <a:br>
+              <a:rPr lang="en-US" sz="1050" dirty="0">
+                <a:solidFill>
+                  <a:schemeClr val="bg1"/>
+                </a:solidFill>
+              </a:rPr>
+            </a:br>
+            <a:r>
+              <a:rPr lang="en-US" sz="1050" dirty="0" err="1">
+                <a:solidFill>
+                  <a:schemeClr val="bg1"/>
+                </a:solidFill>
+              </a:rPr>
+              <a:t>AddressBookStorage</a:t>
+            </a:r>
+            <a:endParaRPr lang="en-SG" sz="1050" dirty="0">
+              <a:solidFill>
+                <a:schemeClr val="bg1"/>
+              </a:solidFill>
+            </a:endParaRPr>
+          </a:p>
+        </p:txBody>
+      </p:sp>
+      <p:sp>
+        <p:nvSpPr>
+          <p:cNvPr id="9" name="Rectangle 62"/>
+          <p:cNvSpPr/>
+          <p:nvPr/>
+        </p:nvSpPr>
+        <p:spPr>
+          <a:xfrm rot="16200000">
+            <a:off x="1683963" y="2868687"/>
+            <a:ext cx="1093635" cy="346760"/>
+          </a:xfrm>
+          <a:prstGeom prst="rect">
+            <a:avLst/>
+          </a:prstGeom>
+          <a:solidFill>
+            <a:schemeClr val="accent6">
+              <a:lumMod val="75000"/>
+            </a:schemeClr>
+          </a:solidFill>
+          <a:ln w="19050">
+            <a:solidFill>
+              <a:schemeClr val="accent6">
+                <a:lumMod val="75000"/>
+              </a:schemeClr>
+            </a:solidFill>
+          </a:ln>
+          <a:effectLst/>
+        </p:spPr>
+        <p:style>
+          <a:lnRef idx="1">
+            <a:schemeClr val="accent2"/>
+          </a:lnRef>
+          <a:fillRef idx="2">
+            <a:schemeClr val="accent2"/>
+          </a:fillRef>
+          <a:effectRef idx="1">
+            <a:schemeClr val="accent2"/>
+          </a:effectRef>
+          <a:fontRef idx="minor">
+            <a:schemeClr val="dk1"/>
+          </a:fontRef>
+        </p:style>
+        <p:txBody>
+          <a:bodyPr rtlCol="0" anchor="ctr"/>
+          <a:lstStyle/>
           <a:p>
             <a:pPr algn="ctr"/>
             <a:r>
-              <a:rPr lang="en-US" sz="1050" dirty="0" smtClean="0">
+              <a:rPr lang="en-US" sz="1050" dirty="0" err="1">
+                <a:solidFill>
+                  <a:schemeClr val="bg1"/>
+                </a:solidFill>
+              </a:rPr>
+              <a:t>StorageManager</a:t>
+            </a:r>
+            <a:endParaRPr lang="en-SG" sz="1050" dirty="0">
+              <a:solidFill>
+                <a:schemeClr val="bg1"/>
+              </a:solidFill>
+            </a:endParaRPr>
+          </a:p>
+        </p:txBody>
+      </p:sp>
+      <p:sp>
+        <p:nvSpPr>
+          <p:cNvPr id="119" name="Rectangle 62"/>
+          <p:cNvSpPr/>
+          <p:nvPr/>
+        </p:nvSpPr>
+        <p:spPr>
+          <a:xfrm rot="16200000">
+            <a:off x="956202" y="2861202"/>
+            <a:ext cx="1093635" cy="346760"/>
+          </a:xfrm>
+          <a:prstGeom prst="rect">
+            <a:avLst/>
+          </a:prstGeom>
+          <a:solidFill>
+            <a:schemeClr val="accent6">
+              <a:lumMod val="75000"/>
+            </a:schemeClr>
+          </a:solidFill>
+          <a:ln w="19050">
+            <a:solidFill>
+              <a:schemeClr val="accent6">
+                <a:lumMod val="75000"/>
+              </a:schemeClr>
+            </a:solidFill>
+          </a:ln>
+          <a:effectLst/>
+        </p:spPr>
+        <p:style>
+          <a:lnRef idx="1">
+            <a:schemeClr val="accent2"/>
+          </a:lnRef>
+          <a:fillRef idx="2">
+            <a:schemeClr val="accent2"/>
+          </a:fillRef>
+          <a:effectRef idx="1">
+            <a:schemeClr val="accent2"/>
+          </a:effectRef>
+          <a:fontRef idx="minor">
+            <a:schemeClr val="dk1"/>
+          </a:fontRef>
+        </p:style>
+        <p:txBody>
+          <a:bodyPr rtlCol="0" anchor="ctr"/>
+          <a:lstStyle/>
+          <a:p>
+            <a:pPr algn="ctr"/>
+            <a:r>
+              <a:rPr lang="en-US" sz="1050" dirty="0">
+                <a:solidFill>
+                  <a:schemeClr val="bg1"/>
+                </a:solidFill>
+              </a:rPr>
+              <a:t>&lt;&lt;interface&gt;&gt;</a:t>
+            </a:r>
+          </a:p>
+          <a:p>
+            <a:pPr algn="ctr"/>
+            <a:r>
+              <a:rPr lang="en-US" sz="1050" dirty="0">
                 <a:solidFill>
                   <a:schemeClr val="bg1"/>
                 </a:solidFill>
@@ -16123,7 +16008,7 @@
           <a:p>
             <a:pPr algn="ctr"/>
             <a:r>
-              <a:rPr lang="en-US" sz="1050" b="1" dirty="0" err="1" smtClean="0">
+              <a:rPr lang="en-US" sz="1050" b="1" dirty="0" err="1">
                 <a:solidFill>
                   <a:schemeClr val="accent6">
                     <a:lumMod val="75000"/>
@@ -16132,18 +16017,8 @@
               </a:rPr>
               <a:t>XmlAddressBook</a:t>
             </a:r>
-            <a:r>
-              <a:rPr lang="en-US" sz="1050" b="1" dirty="0" smtClean="0">
-                <a:solidFill>
-                  <a:schemeClr val="accent6">
-                    <a:lumMod val="75000"/>
-                  </a:schemeClr>
-                </a:solidFill>
-              </a:rPr>
-              <a:t/>
-            </a:r>
             <a:br>
-              <a:rPr lang="en-US" sz="1050" b="1" dirty="0" smtClean="0">
+              <a:rPr lang="en-US" sz="1050" b="1" dirty="0">
                 <a:solidFill>
                   <a:schemeClr val="accent6">
                     <a:lumMod val="75000"/>
@@ -16152,7 +16027,7 @@
               </a:rPr>
             </a:br>
             <a:r>
-              <a:rPr lang="en-US" sz="1050" b="1" dirty="0" smtClean="0">
+              <a:rPr lang="en-US" sz="1050" b="1" dirty="0">
                 <a:solidFill>
                   <a:schemeClr val="accent6">
                     <a:lumMod val="75000"/>
@@ -16219,7 +16094,7 @@
           <a:p>
             <a:pPr algn="ctr"/>
             <a:r>
-              <a:rPr lang="en-US" sz="1050" dirty="0" smtClean="0">
+              <a:rPr lang="en-US" sz="1050" dirty="0">
                 <a:solidFill>
                   <a:schemeClr val="bg1"/>
                 </a:solidFill>
@@ -16227,14 +16102,14 @@
               <a:t>&lt;&lt;interface&gt;&gt;</a:t>
             </a:r>
             <a:br>
-              <a:rPr lang="en-US" sz="1050" dirty="0" smtClean="0">
+              <a:rPr lang="en-US" sz="1050" dirty="0">
                 <a:solidFill>
                   <a:schemeClr val="bg1"/>
                 </a:solidFill>
               </a:rPr>
             </a:br>
             <a:r>
-              <a:rPr lang="en-US" sz="1050" dirty="0" err="1" smtClean="0">
+              <a:rPr lang="en-US" sz="1050" dirty="0" err="1">
                 <a:solidFill>
                   <a:schemeClr val="bg1"/>
                 </a:solidFill>
@@ -16492,30 +16367,22 @@
           <a:p>
             <a:pPr algn="ctr"/>
             <a:r>
-              <a:rPr lang="en-US" sz="1050" dirty="0" err="1" smtClean="0">
+              <a:rPr lang="en-US" sz="1050" dirty="0" err="1">
                 <a:solidFill>
                   <a:schemeClr val="bg1"/>
                 </a:solidFill>
               </a:rPr>
               <a:t>JsonUserPrefs</a:t>
             </a:r>
-            <a:r>
-              <a:rPr lang="en-US" sz="1050" dirty="0" smtClean="0">
-                <a:solidFill>
-                  <a:schemeClr val="bg1"/>
-                </a:solidFill>
-              </a:rPr>
-              <a:t/>
-            </a:r>
             <a:br>
-              <a:rPr lang="en-US" sz="1050" dirty="0" smtClean="0">
+              <a:rPr lang="en-US" sz="1050" dirty="0">
                 <a:solidFill>
                   <a:schemeClr val="bg1"/>
                 </a:solidFill>
               </a:rPr>
             </a:br>
             <a:r>
-              <a:rPr lang="en-US" sz="1050" dirty="0" smtClean="0">
+              <a:rPr lang="en-US" sz="1050" dirty="0">
                 <a:solidFill>
                   <a:schemeClr val="bg1"/>
                 </a:solidFill>
@@ -16567,7 +16434,7 @@
           <a:p>
             <a:pPr algn="ctr"/>
             <a:r>
-              <a:rPr lang="en-US" sz="1050" b="1" dirty="0" err="1" smtClean="0">
+              <a:rPr lang="en-US" sz="1050" b="1" dirty="0" err="1">
                 <a:solidFill>
                   <a:schemeClr val="accent6">
                     <a:lumMod val="75000"/>
@@ -16576,18 +16443,8 @@
               </a:rPr>
               <a:t>XmlSerializable</a:t>
             </a:r>
-            <a:r>
-              <a:rPr lang="en-US" sz="1050" b="1" dirty="0" smtClean="0">
-                <a:solidFill>
-                  <a:schemeClr val="accent6">
-                    <a:lumMod val="75000"/>
-                  </a:schemeClr>
-                </a:solidFill>
-              </a:rPr>
-              <a:t/>
-            </a:r>
             <a:br>
-              <a:rPr lang="en-US" sz="1050" b="1" dirty="0" smtClean="0">
+              <a:rPr lang="en-US" sz="1050" b="1" dirty="0">
                 <a:solidFill>
                   <a:schemeClr val="accent6">
                     <a:lumMod val="75000"/>
@@ -16596,7 +16453,7 @@
               </a:rPr>
             </a:br>
             <a:r>
-              <a:rPr lang="en-US" sz="1050" b="1" dirty="0" err="1" smtClean="0">
+              <a:rPr lang="en-US" sz="1050" b="1" dirty="0" err="1">
                 <a:solidFill>
                   <a:schemeClr val="accent6">
                     <a:lumMod val="75000"/>
@@ -16693,7 +16550,7 @@
           <a:p>
             <a:pPr algn="ctr"/>
             <a:r>
-              <a:rPr lang="en-US" sz="1050" b="1" dirty="0" err="1" smtClean="0">
+              <a:rPr lang="en-US" sz="1050" b="1" dirty="0" err="1">
                 <a:solidFill>
                   <a:schemeClr val="accent6">
                     <a:lumMod val="75000"/>
@@ -16749,7 +16606,7 @@
           <a:p>
             <a:pPr algn="ctr"/>
             <a:r>
-              <a:rPr lang="en-US" sz="1050" b="1" dirty="0" err="1" smtClean="0">
+              <a:rPr lang="en-US" sz="1050" b="1" dirty="0" err="1">
                 <a:solidFill>
                   <a:schemeClr val="accent6">
                     <a:lumMod val="75000"/>
@@ -16819,13 +16676,6 @@
   <p:clrMapOvr>
     <a:masterClrMapping/>
   </p:clrMapOvr>
-  <p:timing>
-    <p:tnLst>
-      <p:par>
-        <p:cTn id="1" dur="indefinite" restart="never" nodeType="tmRoot"/>
-      </p:par>
-    </p:tnLst>
-  </p:timing>
 </p:sld>
 </file>
 

</xml_diff>

<commit_message>
Worked on save directory functionality
</commit_message>
<xml_diff>
--- a/docs/diagrams/Diagrams.pptx
+++ b/docs/diagrams/Diagrams.pptx
@@ -216,7 +216,7 @@
           <a:p>
             <a:fld id="{F5CC4B3F-88C1-4FFA-B1B6-F41C21DC6924}" type="datetimeFigureOut">
               <a:rPr lang="en-US" smtClean="0"/>
-              <a:t>10/20/2016</a:t>
+              <a:t>10/23/2016</a:t>
             </a:fld>
             <a:endParaRPr lang="en-US"/>
           </a:p>
@@ -662,7 +662,7 @@
           <a:p>
             <a:fld id="{78C97017-6FC3-485B-9764-EAC9E56C1D49}" type="datetimeFigureOut">
               <a:rPr lang="en-US" smtClean="0"/>
-              <a:t>10/20/2016</a:t>
+              <a:t>10/23/2016</a:t>
             </a:fld>
             <a:endParaRPr lang="en-US"/>
           </a:p>
@@ -830,7 +830,7 @@
           <a:p>
             <a:fld id="{78C97017-6FC3-485B-9764-EAC9E56C1D49}" type="datetimeFigureOut">
               <a:rPr lang="en-US" smtClean="0"/>
-              <a:t>10/20/2016</a:t>
+              <a:t>10/23/2016</a:t>
             </a:fld>
             <a:endParaRPr lang="en-US"/>
           </a:p>
@@ -1008,7 +1008,7 @@
           <a:p>
             <a:fld id="{78C97017-6FC3-485B-9764-EAC9E56C1D49}" type="datetimeFigureOut">
               <a:rPr lang="en-US" smtClean="0"/>
-              <a:t>10/20/2016</a:t>
+              <a:t>10/23/2016</a:t>
             </a:fld>
             <a:endParaRPr lang="en-US"/>
           </a:p>
@@ -1176,7 +1176,7 @@
           <a:p>
             <a:fld id="{78C97017-6FC3-485B-9764-EAC9E56C1D49}" type="datetimeFigureOut">
               <a:rPr lang="en-US" smtClean="0"/>
-              <a:t>10/20/2016</a:t>
+              <a:t>10/23/2016</a:t>
             </a:fld>
             <a:endParaRPr lang="en-US"/>
           </a:p>
@@ -1421,7 +1421,7 @@
           <a:p>
             <a:fld id="{78C97017-6FC3-485B-9764-EAC9E56C1D49}" type="datetimeFigureOut">
               <a:rPr lang="en-US" smtClean="0"/>
-              <a:t>10/20/2016</a:t>
+              <a:t>10/23/2016</a:t>
             </a:fld>
             <a:endParaRPr lang="en-US"/>
           </a:p>
@@ -1706,7 +1706,7 @@
           <a:p>
             <a:fld id="{78C97017-6FC3-485B-9764-EAC9E56C1D49}" type="datetimeFigureOut">
               <a:rPr lang="en-US" smtClean="0"/>
-              <a:t>10/20/2016</a:t>
+              <a:t>10/23/2016</a:t>
             </a:fld>
             <a:endParaRPr lang="en-US"/>
           </a:p>
@@ -2125,7 +2125,7 @@
           <a:p>
             <a:fld id="{78C97017-6FC3-485B-9764-EAC9E56C1D49}" type="datetimeFigureOut">
               <a:rPr lang="en-US" smtClean="0"/>
-              <a:t>10/20/2016</a:t>
+              <a:t>10/23/2016</a:t>
             </a:fld>
             <a:endParaRPr lang="en-US"/>
           </a:p>
@@ -2242,7 +2242,7 @@
           <a:p>
             <a:fld id="{78C97017-6FC3-485B-9764-EAC9E56C1D49}" type="datetimeFigureOut">
               <a:rPr lang="en-US" smtClean="0"/>
-              <a:t>10/20/2016</a:t>
+              <a:t>10/23/2016</a:t>
             </a:fld>
             <a:endParaRPr lang="en-US"/>
           </a:p>
@@ -2337,7 +2337,7 @@
           <a:p>
             <a:fld id="{78C97017-6FC3-485B-9764-EAC9E56C1D49}" type="datetimeFigureOut">
               <a:rPr lang="en-US" smtClean="0"/>
-              <a:t>10/20/2016</a:t>
+              <a:t>10/23/2016</a:t>
             </a:fld>
             <a:endParaRPr lang="en-US"/>
           </a:p>
@@ -2612,7 +2612,7 @@
           <a:p>
             <a:fld id="{78C97017-6FC3-485B-9764-EAC9E56C1D49}" type="datetimeFigureOut">
               <a:rPr lang="en-US" smtClean="0"/>
-              <a:t>10/20/2016</a:t>
+              <a:t>10/23/2016</a:t>
             </a:fld>
             <a:endParaRPr lang="en-US"/>
           </a:p>
@@ -2864,7 +2864,7 @@
           <a:p>
             <a:fld id="{78C97017-6FC3-485B-9764-EAC9E56C1D49}" type="datetimeFigureOut">
               <a:rPr lang="en-US" smtClean="0"/>
-              <a:t>10/20/2016</a:t>
+              <a:t>10/23/2016</a:t>
             </a:fld>
             <a:endParaRPr lang="en-US"/>
           </a:p>
@@ -3075,7 +3075,7 @@
           <a:p>
             <a:fld id="{78C97017-6FC3-485B-9764-EAC9E56C1D49}" type="datetimeFigureOut">
               <a:rPr lang="en-US" smtClean="0"/>
-              <a:t>10/20/2016</a:t>
+              <a:t>10/23/2016</a:t>
             </a:fld>
             <a:endParaRPr lang="en-US"/>
           </a:p>
@@ -5734,7 +5734,7 @@
                   <a:srgbClr val="7030A0"/>
                 </a:solidFill>
               </a:rPr>
-              <a:t>deletePerson</a:t>
+              <a:t>deleteTask</a:t>
             </a:r>
             <a:r>
               <a:rPr lang="en-US" sz="1400" dirty="0">
@@ -13154,7 +13154,7 @@
         <p:spPr>
           <a:xfrm>
             <a:off x="1119865" y="1727200"/>
-            <a:ext cx="7490735" cy="2997200"/>
+            <a:ext cx="7643135" cy="3073400"/>
           </a:xfrm>
           <a:prstGeom prst="roundRect">
             <a:avLst>
@@ -13978,7 +13978,7 @@
                   <a:srgbClr val="7030A0"/>
                 </a:solidFill>
               </a:rPr>
-              <a:t>UniquePersonList</a:t>
+              <a:t>UniqueTaskList</a:t>
             </a:r>
             <a:endParaRPr lang="en-SG" sz="1050" dirty="0">
               <a:solidFill>
@@ -14221,7 +14221,7 @@
                   <a:srgbClr val="7030A0"/>
                 </a:solidFill>
               </a:rPr>
-              <a:t>Person</a:t>
+              <a:t>Task</a:t>
             </a:r>
             <a:endParaRPr lang="en-SG" sz="1050" dirty="0">
               <a:solidFill>
@@ -14520,7 +14520,7 @@
                   <a:srgbClr val="7030A0"/>
                 </a:solidFill>
               </a:rPr>
-              <a:t>ReadOnlyPerson</a:t>
+              <a:t>ReadOnlyTask</a:t>
             </a:r>
             <a:endParaRPr lang="en-SG" sz="1050" dirty="0">
               <a:solidFill>
@@ -14539,7 +14539,7 @@
         <p:spPr>
           <a:xfrm>
             <a:off x="7712397" y="2564238"/>
-            <a:ext cx="708186" cy="285783"/>
+            <a:ext cx="898202" cy="283133"/>
           </a:xfrm>
           <a:prstGeom prst="rect">
             <a:avLst/>
@@ -14576,7 +14576,7 @@
                   <a:srgbClr val="7030A0"/>
                 </a:solidFill>
               </a:rPr>
-              <a:t>Name</a:t>
+              <a:t>Date</a:t>
             </a:r>
             <a:endParaRPr lang="en-SG" sz="1050" dirty="0">
               <a:solidFill>
@@ -14644,8 +14644,8 @@
         </p:nvCxnSpPr>
         <p:spPr>
           <a:xfrm flipV="1">
-            <a:off x="7277995" y="2707130"/>
-            <a:ext cx="434402" cy="327761"/>
+            <a:off x="7277995" y="2705805"/>
+            <a:ext cx="434402" cy="329086"/>
           </a:xfrm>
           <a:prstGeom prst="bentConnector3">
             <a:avLst/>
@@ -14683,7 +14683,7 @@
         <p:spPr>
           <a:xfrm>
             <a:off x="7712397" y="2887216"/>
-            <a:ext cx="708186" cy="285783"/>
+            <a:ext cx="898202" cy="295007"/>
           </a:xfrm>
           <a:prstGeom prst="rect">
             <a:avLst/>
@@ -14720,7 +14720,7 @@
                   <a:srgbClr val="7030A0"/>
                 </a:solidFill>
               </a:rPr>
-              <a:t>Phone</a:t>
+              <a:t>Time</a:t>
             </a:r>
             <a:endParaRPr lang="en-SG" sz="1050" dirty="0">
               <a:solidFill>
@@ -14741,8 +14741,8 @@
         </p:nvCxnSpPr>
         <p:spPr>
           <a:xfrm flipV="1">
-            <a:off x="7277995" y="3030108"/>
-            <a:ext cx="434402" cy="4783"/>
+            <a:off x="7277995" y="3034720"/>
+            <a:ext cx="434402" cy="171"/>
           </a:xfrm>
           <a:prstGeom prst="bentConnector3">
             <a:avLst/>
@@ -14780,7 +14780,7 @@
         <p:spPr>
           <a:xfrm>
             <a:off x="7712397" y="3210194"/>
-            <a:ext cx="708186" cy="285783"/>
+            <a:ext cx="898202" cy="295006"/>
           </a:xfrm>
           <a:prstGeom prst="rect">
             <a:avLst/>
@@ -14817,7 +14817,7 @@
                   <a:srgbClr val="7030A0"/>
                 </a:solidFill>
               </a:rPr>
-              <a:t>Email</a:t>
+              <a:t>Tag</a:t>
             </a:r>
             <a:endParaRPr lang="en-SG" sz="1050" dirty="0">
               <a:solidFill>
@@ -14839,7 +14839,7 @@
         <p:spPr>
           <a:xfrm>
             <a:off x="7277995" y="3034891"/>
-            <a:ext cx="434402" cy="318195"/>
+            <a:ext cx="434402" cy="322806"/>
           </a:xfrm>
           <a:prstGeom prst="bentConnector3">
             <a:avLst/>
@@ -14876,8 +14876,8 @@
         </p:nvSpPr>
         <p:spPr>
           <a:xfrm>
-            <a:off x="7712397" y="3533171"/>
-            <a:ext cx="708186" cy="285783"/>
+            <a:off x="7712396" y="3533171"/>
+            <a:ext cx="898203" cy="296780"/>
           </a:xfrm>
           <a:prstGeom prst="rect">
             <a:avLst/>
@@ -14909,14 +14909,14 @@
           <a:p>
             <a:pPr algn="ctr"/>
             <a:r>
-              <a:rPr lang="en-US" sz="1050" dirty="0">
+              <a:rPr lang="en-US" sz="1000" dirty="0">
                 <a:solidFill>
                   <a:srgbClr val="7030A0"/>
                 </a:solidFill>
               </a:rPr>
-              <a:t>Address</a:t>
-            </a:r>
-            <a:endParaRPr lang="en-SG" sz="1050" dirty="0">
+              <a:t>Importance</a:t>
+            </a:r>
+            <a:endParaRPr lang="en-SG" sz="1000" dirty="0">
               <a:solidFill>
                 <a:srgbClr val="7030A0"/>
               </a:solidFill>
@@ -14936,7 +14936,7 @@
         <p:spPr>
           <a:xfrm>
             <a:off x="7277995" y="3034891"/>
-            <a:ext cx="434402" cy="641172"/>
+            <a:ext cx="434401" cy="646670"/>
           </a:xfrm>
           <a:prstGeom prst="bentConnector3">
             <a:avLst/>
@@ -15442,7 +15442,7 @@
                   <a:schemeClr val="bg1"/>
                 </a:solidFill>
               </a:rPr>
-              <a:t>AddressBookStorage</a:t>
+              <a:t>TaskListStorage</a:t>
             </a:r>
             <a:endParaRPr lang="en-SG" sz="1050" dirty="0">
               <a:solidFill>
@@ -16015,7 +16015,7 @@
                   </a:schemeClr>
                 </a:solidFill>
               </a:rPr>
-              <a:t>XmlAddressBook</a:t>
+              <a:t>XmlTaskList</a:t>
             </a:r>
             <a:br>
               <a:rPr lang="en-US" sz="1050" b="1" dirty="0">
@@ -16460,7 +16460,7 @@
                   </a:schemeClr>
                 </a:solidFill>
               </a:rPr>
-              <a:t>AddressBook</a:t>
+              <a:t>TaskList</a:t>
             </a:r>
             <a:endParaRPr lang="en-SG" sz="1050" b="1" dirty="0">
               <a:solidFill>
@@ -16613,7 +16613,7 @@
                   </a:schemeClr>
                 </a:solidFill>
               </a:rPr>
-              <a:t>XmlAdaptedPerson</a:t>
+              <a:t>XmlAdaptedTask</a:t>
             </a:r>
             <a:endParaRPr lang="en-SG" sz="1050" b="1" dirty="0">
               <a:solidFill>

</xml_diff>

<commit_message>
Updated diagrams in ppt to suit tasklist
</commit_message>
<xml_diff>
--- a/docs/diagrams/Diagrams.pptx
+++ b/docs/diagrams/Diagrams.pptx
@@ -5,7 +5,7 @@
     <p:sldMasterId id="2147483648" r:id="rId1"/>
   </p:sldMasterIdLst>
   <p:notesMasterIdLst>
-    <p:notesMasterId r:id="rId11"/>
+    <p:notesMasterId r:id="rId10"/>
   </p:notesMasterIdLst>
   <p:sldIdLst>
     <p:sldId id="256" r:id="rId2"/>
@@ -16,7 +16,6 @@
     <p:sldId id="267" r:id="rId7"/>
     <p:sldId id="263" r:id="rId8"/>
     <p:sldId id="264" r:id="rId9"/>
-    <p:sldId id="265" r:id="rId10"/>
   </p:sldIdLst>
   <p:sldSz cx="9144000" cy="6858000" type="screen4x3"/>
   <p:notesSz cx="6858000" cy="9144000"/>
@@ -216,7 +215,7 @@
           <a:p>
             <a:fld id="{F5CC4B3F-88C1-4FFA-B1B6-F41C21DC6924}" type="datetimeFigureOut">
               <a:rPr lang="en-US" smtClean="0"/>
-              <a:t>10/20/2016</a:t>
+              <a:t>10/26/2016</a:t>
             </a:fld>
             <a:endParaRPr lang="en-US"/>
           </a:p>
@@ -662,7 +661,7 @@
           <a:p>
             <a:fld id="{78C97017-6FC3-485B-9764-EAC9E56C1D49}" type="datetimeFigureOut">
               <a:rPr lang="en-US" smtClean="0"/>
-              <a:t>10/20/2016</a:t>
+              <a:t>10/26/2016</a:t>
             </a:fld>
             <a:endParaRPr lang="en-US"/>
           </a:p>
@@ -830,7 +829,7 @@
           <a:p>
             <a:fld id="{78C97017-6FC3-485B-9764-EAC9E56C1D49}" type="datetimeFigureOut">
               <a:rPr lang="en-US" smtClean="0"/>
-              <a:t>10/20/2016</a:t>
+              <a:t>10/26/2016</a:t>
             </a:fld>
             <a:endParaRPr lang="en-US"/>
           </a:p>
@@ -1008,7 +1007,7 @@
           <a:p>
             <a:fld id="{78C97017-6FC3-485B-9764-EAC9E56C1D49}" type="datetimeFigureOut">
               <a:rPr lang="en-US" smtClean="0"/>
-              <a:t>10/20/2016</a:t>
+              <a:t>10/26/2016</a:t>
             </a:fld>
             <a:endParaRPr lang="en-US"/>
           </a:p>
@@ -1176,7 +1175,7 @@
           <a:p>
             <a:fld id="{78C97017-6FC3-485B-9764-EAC9E56C1D49}" type="datetimeFigureOut">
               <a:rPr lang="en-US" smtClean="0"/>
-              <a:t>10/20/2016</a:t>
+              <a:t>10/26/2016</a:t>
             </a:fld>
             <a:endParaRPr lang="en-US"/>
           </a:p>
@@ -1421,7 +1420,7 @@
           <a:p>
             <a:fld id="{78C97017-6FC3-485B-9764-EAC9E56C1D49}" type="datetimeFigureOut">
               <a:rPr lang="en-US" smtClean="0"/>
-              <a:t>10/20/2016</a:t>
+              <a:t>10/26/2016</a:t>
             </a:fld>
             <a:endParaRPr lang="en-US"/>
           </a:p>
@@ -1706,7 +1705,7 @@
           <a:p>
             <a:fld id="{78C97017-6FC3-485B-9764-EAC9E56C1D49}" type="datetimeFigureOut">
               <a:rPr lang="en-US" smtClean="0"/>
-              <a:t>10/20/2016</a:t>
+              <a:t>10/26/2016</a:t>
             </a:fld>
             <a:endParaRPr lang="en-US"/>
           </a:p>
@@ -2125,7 +2124,7 @@
           <a:p>
             <a:fld id="{78C97017-6FC3-485B-9764-EAC9E56C1D49}" type="datetimeFigureOut">
               <a:rPr lang="en-US" smtClean="0"/>
-              <a:t>10/20/2016</a:t>
+              <a:t>10/26/2016</a:t>
             </a:fld>
             <a:endParaRPr lang="en-US"/>
           </a:p>
@@ -2242,7 +2241,7 @@
           <a:p>
             <a:fld id="{78C97017-6FC3-485B-9764-EAC9E56C1D49}" type="datetimeFigureOut">
               <a:rPr lang="en-US" smtClean="0"/>
-              <a:t>10/20/2016</a:t>
+              <a:t>10/26/2016</a:t>
             </a:fld>
             <a:endParaRPr lang="en-US"/>
           </a:p>
@@ -2337,7 +2336,7 @@
           <a:p>
             <a:fld id="{78C97017-6FC3-485B-9764-EAC9E56C1D49}" type="datetimeFigureOut">
               <a:rPr lang="en-US" smtClean="0"/>
-              <a:t>10/20/2016</a:t>
+              <a:t>10/26/2016</a:t>
             </a:fld>
             <a:endParaRPr lang="en-US"/>
           </a:p>
@@ -2612,7 +2611,7 @@
           <a:p>
             <a:fld id="{78C97017-6FC3-485B-9764-EAC9E56C1D49}" type="datetimeFigureOut">
               <a:rPr lang="en-US" smtClean="0"/>
-              <a:t>10/20/2016</a:t>
+              <a:t>10/26/2016</a:t>
             </a:fld>
             <a:endParaRPr lang="en-US"/>
           </a:p>
@@ -2864,7 +2863,7 @@
           <a:p>
             <a:fld id="{78C97017-6FC3-485B-9764-EAC9E56C1D49}" type="datetimeFigureOut">
               <a:rPr lang="en-US" smtClean="0"/>
-              <a:t>10/20/2016</a:t>
+              <a:t>10/26/2016</a:t>
             </a:fld>
             <a:endParaRPr lang="en-US"/>
           </a:p>
@@ -3075,7 +3074,7 @@
           <a:p>
             <a:fld id="{78C97017-6FC3-485B-9764-EAC9E56C1D49}" type="datetimeFigureOut">
               <a:rPr lang="en-US" smtClean="0"/>
-              <a:t>10/20/2016</a:t>
+              <a:t>10/26/2016</a:t>
             </a:fld>
             <a:endParaRPr lang="en-US"/>
           </a:p>
@@ -5734,7 +5733,7 @@
                   <a:srgbClr val="7030A0"/>
                 </a:solidFill>
               </a:rPr>
-              <a:t>deletePerson</a:t>
+              <a:t>deleteTask</a:t>
             </a:r>
             <a:r>
               <a:rPr lang="en-US" sz="1400" dirty="0">
@@ -13978,7 +13977,7 @@
                   <a:srgbClr val="7030A0"/>
                 </a:solidFill>
               </a:rPr>
-              <a:t>UniquePersonList</a:t>
+              <a:t>UniqueTaskList</a:t>
             </a:r>
             <a:endParaRPr lang="en-SG" sz="1050" dirty="0">
               <a:solidFill>
@@ -14221,7 +14220,7 @@
                   <a:srgbClr val="7030A0"/>
                 </a:solidFill>
               </a:rPr>
-              <a:t>Person</a:t>
+              <a:t>Task</a:t>
             </a:r>
             <a:endParaRPr lang="en-SG" sz="1050" dirty="0">
               <a:solidFill>
@@ -14520,7 +14519,7 @@
                   <a:srgbClr val="7030A0"/>
                 </a:solidFill>
               </a:rPr>
-              <a:t>ReadOnlyPerson</a:t>
+              <a:t>ReadOnlyTask</a:t>
             </a:r>
             <a:endParaRPr lang="en-SG" sz="1050" dirty="0">
               <a:solidFill>
@@ -14539,7 +14538,7 @@
         <p:spPr>
           <a:xfrm>
             <a:off x="7712397" y="2564238"/>
-            <a:ext cx="708186" cy="285783"/>
+            <a:ext cx="822002" cy="293828"/>
           </a:xfrm>
           <a:prstGeom prst="rect">
             <a:avLst/>
@@ -14576,7 +14575,7 @@
                   <a:srgbClr val="7030A0"/>
                 </a:solidFill>
               </a:rPr>
-              <a:t>Name</a:t>
+              <a:t>Date</a:t>
             </a:r>
             <a:endParaRPr lang="en-SG" sz="1050" dirty="0">
               <a:solidFill>
@@ -14644,8 +14643,8 @@
         </p:nvCxnSpPr>
         <p:spPr>
           <a:xfrm flipV="1">
-            <a:off x="7277995" y="2707130"/>
-            <a:ext cx="434402" cy="327761"/>
+            <a:off x="7277995" y="2711152"/>
+            <a:ext cx="434402" cy="323739"/>
           </a:xfrm>
           <a:prstGeom prst="bentConnector3">
             <a:avLst/>
@@ -14683,7 +14682,7 @@
         <p:spPr>
           <a:xfrm>
             <a:off x="7712397" y="2887216"/>
-            <a:ext cx="708186" cy="285783"/>
+            <a:ext cx="822002" cy="265201"/>
           </a:xfrm>
           <a:prstGeom prst="rect">
             <a:avLst/>
@@ -14720,7 +14719,7 @@
                   <a:srgbClr val="7030A0"/>
                 </a:solidFill>
               </a:rPr>
-              <a:t>Phone</a:t>
+              <a:t>Time</a:t>
             </a:r>
             <a:endParaRPr lang="en-SG" sz="1050" dirty="0">
               <a:solidFill>
@@ -14741,8 +14740,8 @@
         </p:nvCxnSpPr>
         <p:spPr>
           <a:xfrm flipV="1">
-            <a:off x="7277995" y="3030108"/>
-            <a:ext cx="434402" cy="4783"/>
+            <a:off x="7277995" y="3019817"/>
+            <a:ext cx="434402" cy="15074"/>
           </a:xfrm>
           <a:prstGeom prst="bentConnector3">
             <a:avLst/>
@@ -14779,8 +14778,8 @@
         </p:nvSpPr>
         <p:spPr>
           <a:xfrm>
-            <a:off x="7712397" y="3210194"/>
-            <a:ext cx="708186" cy="285783"/>
+            <a:off x="7712396" y="3210195"/>
+            <a:ext cx="822003" cy="265198"/>
           </a:xfrm>
           <a:prstGeom prst="rect">
             <a:avLst/>
@@ -14817,7 +14816,7 @@
                   <a:srgbClr val="7030A0"/>
                 </a:solidFill>
               </a:rPr>
-              <a:t>Email</a:t>
+              <a:t>Importance</a:t>
             </a:r>
             <a:endParaRPr lang="en-SG" sz="1050" dirty="0">
               <a:solidFill>
@@ -14839,7 +14838,7 @@
         <p:spPr>
           <a:xfrm>
             <a:off x="7277995" y="3034891"/>
-            <a:ext cx="434402" cy="318195"/>
+            <a:ext cx="434401" cy="307903"/>
           </a:xfrm>
           <a:prstGeom prst="bentConnector3">
             <a:avLst/>
@@ -14877,7 +14876,7 @@
         <p:spPr>
           <a:xfrm>
             <a:off x="7712397" y="3533171"/>
-            <a:ext cx="708186" cy="285783"/>
+            <a:ext cx="822002" cy="296780"/>
           </a:xfrm>
           <a:prstGeom prst="rect">
             <a:avLst/>
@@ -14914,7 +14913,7 @@
                   <a:srgbClr val="7030A0"/>
                 </a:solidFill>
               </a:rPr>
-              <a:t>Address</a:t>
+              <a:t>Tags</a:t>
             </a:r>
             <a:endParaRPr lang="en-SG" sz="1050" dirty="0">
               <a:solidFill>
@@ -14936,7 +14935,7 @@
         <p:spPr>
           <a:xfrm>
             <a:off x="7277995" y="3034891"/>
-            <a:ext cx="434402" cy="641172"/>
+            <a:ext cx="434402" cy="646670"/>
           </a:xfrm>
           <a:prstGeom prst="bentConnector3">
             <a:avLst/>
@@ -15279,6 +15278,131 @@
           </a:fontRef>
         </p:style>
       </p:cxnSp>
+      <p:cxnSp>
+        <p:nvCxnSpPr>
+          <p:cNvPr id="65" name="Elbow Connector 85"/>
+          <p:cNvCxnSpPr/>
+          <p:nvPr/>
+        </p:nvCxnSpPr>
+        <p:spPr>
+          <a:xfrm flipV="1">
+            <a:off x="7495195" y="4038599"/>
+            <a:ext cx="217201" cy="1"/>
+          </a:xfrm>
+          <a:prstGeom prst="straightConnector1">
+            <a:avLst/>
+          </a:prstGeom>
+          <a:ln w="19050">
+            <a:solidFill>
+              <a:srgbClr val="7030A0"/>
+            </a:solidFill>
+            <a:headEnd type="none" w="med" len="med"/>
+            <a:tailEnd type="arrow" w="med" len="med"/>
+          </a:ln>
+          <a:effectLst/>
+        </p:spPr>
+        <p:style>
+          <a:lnRef idx="1">
+            <a:schemeClr val="accent2"/>
+          </a:lnRef>
+          <a:fillRef idx="2">
+            <a:schemeClr val="accent2"/>
+          </a:fillRef>
+          <a:effectRef idx="1">
+            <a:schemeClr val="accent2"/>
+          </a:effectRef>
+          <a:fontRef idx="minor">
+            <a:schemeClr val="dk1"/>
+          </a:fontRef>
+        </p:style>
+      </p:cxnSp>
+      <p:cxnSp>
+        <p:nvCxnSpPr>
+          <p:cNvPr id="28" name="Straight Connector 27"/>
+          <p:cNvCxnSpPr/>
+          <p:nvPr/>
+        </p:nvCxnSpPr>
+        <p:spPr>
+          <a:xfrm>
+            <a:off x="7495195" y="3681561"/>
+            <a:ext cx="0" cy="353029"/>
+          </a:xfrm>
+          <a:prstGeom prst="line">
+            <a:avLst/>
+          </a:prstGeom>
+          <a:ln w="19050"/>
+        </p:spPr>
+        <p:style>
+          <a:lnRef idx="1">
+            <a:schemeClr val="accent4"/>
+          </a:lnRef>
+          <a:fillRef idx="0">
+            <a:schemeClr val="accent4"/>
+          </a:fillRef>
+          <a:effectRef idx="0">
+            <a:schemeClr val="accent4"/>
+          </a:effectRef>
+          <a:fontRef idx="minor">
+            <a:schemeClr val="tx1"/>
+          </a:fontRef>
+        </p:style>
+      </p:cxnSp>
+      <p:sp>
+        <p:nvSpPr>
+          <p:cNvPr id="73" name="Rectangle 8"/>
+          <p:cNvSpPr/>
+          <p:nvPr/>
+        </p:nvSpPr>
+        <p:spPr>
+          <a:xfrm>
+            <a:off x="7712398" y="3886200"/>
+            <a:ext cx="822002" cy="296780"/>
+          </a:xfrm>
+          <a:prstGeom prst="rect">
+            <a:avLst/>
+          </a:prstGeom>
+          <a:ln w="19050">
+            <a:solidFill>
+              <a:srgbClr val="7030A0"/>
+            </a:solidFill>
+          </a:ln>
+          <a:effectLst/>
+        </p:spPr>
+        <p:style>
+          <a:lnRef idx="1">
+            <a:schemeClr val="accent4"/>
+          </a:lnRef>
+          <a:fillRef idx="2">
+            <a:schemeClr val="accent4"/>
+          </a:fillRef>
+          <a:effectRef idx="1">
+            <a:schemeClr val="accent4"/>
+          </a:effectRef>
+          <a:fontRef idx="minor">
+            <a:schemeClr val="dk1"/>
+          </a:fontRef>
+        </p:style>
+        <p:txBody>
+          <a:bodyPr rtlCol="0" anchor="ctr"/>
+          <a:lstStyle/>
+          <a:p>
+            <a:pPr algn="ctr"/>
+            <a:r>
+              <a:rPr lang="en-US" sz="1050" dirty="0">
+                <a:solidFill>
+                  <a:srgbClr val="7030A0"/>
+                </a:solidFill>
+              </a:rPr>
+              <a:t>Reminder</a:t>
+            </a:r>
+            <a:endParaRPr lang="en-SG" sz="1050" dirty="0">
+              <a:solidFill>
+                <a:srgbClr val="7030A0"/>
+              </a:solidFill>
+            </a:endParaRPr>
+          </a:p>
+        </p:txBody>
+      </p:sp>
     </p:spTree>
     <p:extLst>
       <p:ext uri="{BB962C8B-B14F-4D97-AF65-F5344CB8AC3E}">
@@ -15442,7 +15566,7 @@
                   <a:schemeClr val="bg1"/>
                 </a:solidFill>
               </a:rPr>
-              <a:t>AddressBookStorage</a:t>
+              <a:t>TaskListStorage</a:t>
             </a:r>
             <a:endParaRPr lang="en-SG" sz="1050" dirty="0">
               <a:solidFill>
@@ -16015,7 +16139,7 @@
                   </a:schemeClr>
                 </a:solidFill>
               </a:rPr>
-              <a:t>XmlAddressBook</a:t>
+              <a:t>XmlTaskList</a:t>
             </a:r>
             <a:br>
               <a:rPr lang="en-US" sz="1050" b="1" dirty="0">
@@ -16460,7 +16584,7 @@
                   </a:schemeClr>
                 </a:solidFill>
               </a:rPr>
-              <a:t>AddressBook</a:t>
+              <a:t>TaskList</a:t>
             </a:r>
             <a:endParaRPr lang="en-SG" sz="1050" b="1" dirty="0">
               <a:solidFill>
@@ -16613,7 +16737,7 @@
                   </a:schemeClr>
                 </a:solidFill>
               </a:rPr>
-              <a:t>XmlAdaptedPerson</a:t>
+              <a:t>XmlAdaptedTask</a:t>
             </a:r>
             <a:endParaRPr lang="en-SG" sz="1050" b="1" dirty="0">
               <a:solidFill>
@@ -16670,36 +16794,6 @@
     <p:extLst>
       <p:ext uri="{BB962C8B-B14F-4D97-AF65-F5344CB8AC3E}">
         <p14:creationId xmlns:p14="http://schemas.microsoft.com/office/powerpoint/2010/main" val="1478832369"/>
-      </p:ext>
-    </p:extLst>
-  </p:cSld>
-  <p:clrMapOvr>
-    <a:masterClrMapping/>
-  </p:clrMapOvr>
-</p:sld>
-</file>
-
-<file path=ppt/slides/slide9.xml><?xml version="1.0" encoding="utf-8"?>
-<p:sld xmlns:a="http://schemas.openxmlformats.org/drawingml/2006/main" xmlns:r="http://schemas.openxmlformats.org/officeDocument/2006/relationships" xmlns:p="http://schemas.openxmlformats.org/presentationml/2006/main">
-  <p:cSld>
-    <p:spTree>
-      <p:nvGrpSpPr>
-        <p:cNvPr id="1" name=""/>
-        <p:cNvGrpSpPr/>
-        <p:nvPr/>
-      </p:nvGrpSpPr>
-      <p:grpSpPr>
-        <a:xfrm>
-          <a:off x="0" y="0"/>
-          <a:ext cx="0" cy="0"/>
-          <a:chOff x="0" y="0"/>
-          <a:chExt cx="0" cy="0"/>
-        </a:xfrm>
-      </p:grpSpPr>
-    </p:spTree>
-    <p:extLst>
-      <p:ext uri="{BB962C8B-B14F-4D97-AF65-F5344CB8AC3E}">
-        <p14:creationId xmlns:p14="http://schemas.microsoft.com/office/powerpoint/2010/main" val="2978036214"/>
       </p:ext>
     </p:extLst>
   </p:cSld>

</xml_diff>

<commit_message>
Updated Developer Guide Diagrams
</commit_message>
<xml_diff>
--- a/docs/diagrams/Diagrams.pptx
+++ b/docs/diagrams/Diagrams.pptx
@@ -215,7 +215,7 @@
           <a:p>
             <a:fld id="{F5CC4B3F-88C1-4FFA-B1B6-F41C21DC6924}" type="datetimeFigureOut">
               <a:rPr lang="en-US" smtClean="0"/>
-              <a:t>10/26/2016</a:t>
+              <a:t>7/11/2016</a:t>
             </a:fld>
             <a:endParaRPr lang="en-US"/>
           </a:p>
@@ -661,7 +661,7 @@
           <a:p>
             <a:fld id="{78C97017-6FC3-485B-9764-EAC9E56C1D49}" type="datetimeFigureOut">
               <a:rPr lang="en-US" smtClean="0"/>
-              <a:t>10/26/2016</a:t>
+              <a:t>7/11/2016</a:t>
             </a:fld>
             <a:endParaRPr lang="en-US"/>
           </a:p>
@@ -829,7 +829,7 @@
           <a:p>
             <a:fld id="{78C97017-6FC3-485B-9764-EAC9E56C1D49}" type="datetimeFigureOut">
               <a:rPr lang="en-US" smtClean="0"/>
-              <a:t>10/26/2016</a:t>
+              <a:t>7/11/2016</a:t>
             </a:fld>
             <a:endParaRPr lang="en-US"/>
           </a:p>
@@ -1007,7 +1007,7 @@
           <a:p>
             <a:fld id="{78C97017-6FC3-485B-9764-EAC9E56C1D49}" type="datetimeFigureOut">
               <a:rPr lang="en-US" smtClean="0"/>
-              <a:t>10/26/2016</a:t>
+              <a:t>7/11/2016</a:t>
             </a:fld>
             <a:endParaRPr lang="en-US"/>
           </a:p>
@@ -1175,7 +1175,7 @@
           <a:p>
             <a:fld id="{78C97017-6FC3-485B-9764-EAC9E56C1D49}" type="datetimeFigureOut">
               <a:rPr lang="en-US" smtClean="0"/>
-              <a:t>10/26/2016</a:t>
+              <a:t>7/11/2016</a:t>
             </a:fld>
             <a:endParaRPr lang="en-US"/>
           </a:p>
@@ -1420,7 +1420,7 @@
           <a:p>
             <a:fld id="{78C97017-6FC3-485B-9764-EAC9E56C1D49}" type="datetimeFigureOut">
               <a:rPr lang="en-US" smtClean="0"/>
-              <a:t>10/26/2016</a:t>
+              <a:t>7/11/2016</a:t>
             </a:fld>
             <a:endParaRPr lang="en-US"/>
           </a:p>
@@ -1705,7 +1705,7 @@
           <a:p>
             <a:fld id="{78C97017-6FC3-485B-9764-EAC9E56C1D49}" type="datetimeFigureOut">
               <a:rPr lang="en-US" smtClean="0"/>
-              <a:t>10/26/2016</a:t>
+              <a:t>7/11/2016</a:t>
             </a:fld>
             <a:endParaRPr lang="en-US"/>
           </a:p>
@@ -2124,7 +2124,7 @@
           <a:p>
             <a:fld id="{78C97017-6FC3-485B-9764-EAC9E56C1D49}" type="datetimeFigureOut">
               <a:rPr lang="en-US" smtClean="0"/>
-              <a:t>10/26/2016</a:t>
+              <a:t>7/11/2016</a:t>
             </a:fld>
             <a:endParaRPr lang="en-US"/>
           </a:p>
@@ -2241,7 +2241,7 @@
           <a:p>
             <a:fld id="{78C97017-6FC3-485B-9764-EAC9E56C1D49}" type="datetimeFigureOut">
               <a:rPr lang="en-US" smtClean="0"/>
-              <a:t>10/26/2016</a:t>
+              <a:t>7/11/2016</a:t>
             </a:fld>
             <a:endParaRPr lang="en-US"/>
           </a:p>
@@ -2336,7 +2336,7 @@
           <a:p>
             <a:fld id="{78C97017-6FC3-485B-9764-EAC9E56C1D49}" type="datetimeFigureOut">
               <a:rPr lang="en-US" smtClean="0"/>
-              <a:t>10/26/2016</a:t>
+              <a:t>7/11/2016</a:t>
             </a:fld>
             <a:endParaRPr lang="en-US"/>
           </a:p>
@@ -2611,7 +2611,7 @@
           <a:p>
             <a:fld id="{78C97017-6FC3-485B-9764-EAC9E56C1D49}" type="datetimeFigureOut">
               <a:rPr lang="en-US" smtClean="0"/>
-              <a:t>10/26/2016</a:t>
+              <a:t>7/11/2016</a:t>
             </a:fld>
             <a:endParaRPr lang="en-US"/>
           </a:p>
@@ -2863,7 +2863,7 @@
           <a:p>
             <a:fld id="{78C97017-6FC3-485B-9764-EAC9E56C1D49}" type="datetimeFigureOut">
               <a:rPr lang="en-US" smtClean="0"/>
-              <a:t>10/26/2016</a:t>
+              <a:t>7/11/2016</a:t>
             </a:fld>
             <a:endParaRPr lang="en-US"/>
           </a:p>
@@ -3074,7 +3074,7 @@
           <a:p>
             <a:fld id="{78C97017-6FC3-485B-9764-EAC9E56C1D49}" type="datetimeFigureOut">
               <a:rPr lang="en-US" smtClean="0"/>
-              <a:t>10/26/2016</a:t>
+              <a:t>7/11/2016</a:t>
             </a:fld>
             <a:endParaRPr lang="en-US"/>
           </a:p>
@@ -3465,13 +3465,10 @@
           <a:lstStyle/>
           <a:p>
             <a:r>
-              <a:rPr lang="en-US" dirty="0" err="1"/>
-              <a:t>AddressBook</a:t>
+              <a:rPr lang="en-US" dirty="0" smtClean="0"/>
+              <a:t>Inbx_0</a:t>
             </a:r>
-            <a:r>
-              <a:rPr lang="en-US" dirty="0"/>
-              <a:t> – Level 4</a:t>
-            </a:r>
+            <a:endParaRPr lang="en-US" dirty="0"/>
           </a:p>
         </p:txBody>
       </p:sp>
@@ -7560,6 +7557,13 @@
   <p:clrMapOvr>
     <a:masterClrMapping/>
   </p:clrMapOvr>
+  <p:timing>
+    <p:tnLst>
+      <p:par>
+        <p:cTn id="1" dur="indefinite" restart="never" nodeType="tmRoot"/>
+      </p:par>
+    </p:tnLst>
+  </p:timing>
 </p:sld>
 </file>
 
@@ -7588,8 +7592,8 @@
         </p:nvGrpSpPr>
         <p:grpSpPr>
           <a:xfrm>
-            <a:off x="644735" y="1447799"/>
-            <a:ext cx="6418826" cy="3962401"/>
+            <a:off x="644734" y="609601"/>
+            <a:ext cx="7280065" cy="4800600"/>
             <a:chOff x="644735" y="1447799"/>
             <a:chExt cx="6418826" cy="3962401"/>
           </a:xfrm>
@@ -8070,14 +8074,14 @@
             <a:p>
               <a:pPr algn="ctr"/>
               <a:r>
-                <a:rPr lang="en-US" sz="1050" b="1" dirty="0" err="1">
+                <a:rPr lang="en-US" sz="1050" b="1" dirty="0" err="1" smtClean="0">
                   <a:solidFill>
                     <a:schemeClr val="accent3">
                       <a:lumMod val="75000"/>
                     </a:schemeClr>
                   </a:solidFill>
                 </a:rPr>
-                <a:t>BrowserPanel</a:t>
+                <a:t>InfoPanel</a:t>
               </a:r>
               <a:endParaRPr lang="en-SG" sz="1050" b="1" dirty="0">
                 <a:solidFill>
@@ -8157,7 +8161,7 @@
           </p:nvSpPr>
           <p:spPr>
             <a:xfrm>
-              <a:off x="2592526" y="3991960"/>
+              <a:off x="2592526" y="4104139"/>
               <a:ext cx="1093635" cy="236841"/>
             </a:xfrm>
             <a:prstGeom prst="rect">
@@ -8217,7 +8221,7 @@
           </p:nvSpPr>
           <p:spPr>
             <a:xfrm>
-              <a:off x="3839323" y="4228801"/>
+              <a:off x="3771474" y="4292825"/>
               <a:ext cx="1040906" cy="236841"/>
             </a:xfrm>
             <a:prstGeom prst="rect">
@@ -8522,15 +8526,12 @@
         <p:cxnSp>
           <p:nvCxnSpPr>
             <p:cNvPr id="47" name="Elbow Connector 63"/>
-            <p:cNvCxnSpPr>
-              <a:stCxn id="39" idx="2"/>
-              <a:endCxn id="36" idx="1"/>
-            </p:cNvCxnSpPr>
+            <p:cNvCxnSpPr/>
             <p:nvPr/>
           </p:nvCxnSpPr>
           <p:spPr>
             <a:xfrm rot="16200000" flipH="1">
-              <a:off x="1883148" y="3401003"/>
+              <a:off x="1872749" y="3505657"/>
               <a:ext cx="1242356" cy="176400"/>
             </a:xfrm>
             <a:prstGeom prst="bentConnector2">
@@ -8611,8 +8612,8 @@
           </p:nvCxnSpPr>
           <p:spPr>
             <a:xfrm rot="16200000" flipH="1">
-              <a:off x="1184119" y="3676012"/>
-              <a:ext cx="2396440" cy="420377"/>
+              <a:off x="1229544" y="3721437"/>
+              <a:ext cx="2396441" cy="329526"/>
             </a:xfrm>
             <a:prstGeom prst="bentConnector2">
               <a:avLst/>
@@ -8772,8 +8773,8 @@
           </p:nvCxnSpPr>
           <p:spPr>
             <a:xfrm rot="5400000">
-              <a:off x="4174488" y="2991741"/>
-              <a:ext cx="2061222" cy="649740"/>
+              <a:off x="4108552" y="2989829"/>
+              <a:ext cx="2125245" cy="717589"/>
             </a:xfrm>
             <a:prstGeom prst="bentConnector2">
               <a:avLst/>
@@ -9153,7 +9154,7 @@
           </p:nvSpPr>
           <p:spPr>
             <a:xfrm rot="16200000">
-              <a:off x="6213739" y="4560376"/>
+              <a:off x="6213739" y="4422491"/>
               <a:ext cx="1371599" cy="328045"/>
             </a:xfrm>
             <a:prstGeom prst="roundRect">
@@ -9449,47 +9450,6 @@
         </p:cxnSp>
         <p:cxnSp>
           <p:nvCxnSpPr>
-            <p:cNvPr id="137" name="Elbow Connector 136"/>
-            <p:cNvCxnSpPr>
-              <a:stCxn id="36" idx="2"/>
-              <a:endCxn id="37" idx="1"/>
-            </p:cNvCxnSpPr>
-            <p:nvPr/>
-          </p:nvCxnSpPr>
-          <p:spPr>
-            <a:xfrm rot="16200000" flipH="1">
-              <a:off x="3430123" y="3938021"/>
-              <a:ext cx="118421" cy="699979"/>
-            </a:xfrm>
-            <a:prstGeom prst="bentConnector2">
-              <a:avLst/>
-            </a:prstGeom>
-            <a:ln w="19050">
-              <a:solidFill>
-                <a:schemeClr val="accent3"/>
-              </a:solidFill>
-              <a:headEnd type="none" w="med" len="med"/>
-              <a:tailEnd type="arrow" w="med" len="med"/>
-            </a:ln>
-            <a:effectLst/>
-          </p:spPr>
-          <p:style>
-            <a:lnRef idx="1">
-              <a:schemeClr val="accent2"/>
-            </a:lnRef>
-            <a:fillRef idx="2">
-              <a:schemeClr val="accent2"/>
-            </a:fillRef>
-            <a:effectRef idx="1">
-              <a:schemeClr val="accent2"/>
-            </a:effectRef>
-            <a:fontRef idx="minor">
-              <a:schemeClr val="dk1"/>
-            </a:fontRef>
-          </p:style>
-        </p:cxnSp>
-        <p:cxnSp>
-          <p:nvCxnSpPr>
             <p:cNvPr id="140" name="Elbow Connector 63"/>
             <p:cNvCxnSpPr>
               <a:stCxn id="16" idx="3"/>
@@ -9499,8 +9459,8 @@
           </p:nvCxnSpPr>
           <p:spPr>
             <a:xfrm rot="5400000">
-              <a:off x="3695875" y="2276286"/>
-              <a:ext cx="1824381" cy="1843808"/>
+              <a:off x="3639786" y="2332376"/>
+              <a:ext cx="1936559" cy="1843808"/>
             </a:xfrm>
             <a:prstGeom prst="bentConnector2">
               <a:avLst/>
@@ -9725,8 +9685,8 @@
           </p:nvSpPr>
           <p:spPr>
             <a:xfrm flipV="1">
-              <a:off x="4114799" y="4472708"/>
-              <a:ext cx="2642195" cy="101600"/>
+              <a:off x="4114799" y="4529665"/>
+              <a:ext cx="2642195" cy="37736"/>
             </a:xfrm>
             <a:custGeom>
               <a:avLst/>
@@ -9795,11 +9755,373 @@
             <a:lstStyle/>
             <a:p>
               <a:pPr algn="ctr"/>
-              <a:endParaRPr lang="en-SG"/>
+              <a:endParaRPr lang="en-SG" dirty="0"/>
             </a:p>
           </p:txBody>
         </p:sp>
       </p:grpSp>
+      <p:sp>
+        <p:nvSpPr>
+          <p:cNvPr id="48" name="Rectangle 11"/>
+          <p:cNvSpPr/>
+          <p:nvPr/>
+        </p:nvSpPr>
+        <p:spPr>
+          <a:xfrm>
+            <a:off x="4114800" y="3547406"/>
+            <a:ext cx="902927" cy="262594"/>
+          </a:xfrm>
+          <a:prstGeom prst="rect">
+            <a:avLst/>
+          </a:prstGeom>
+          <a:ln w="19050">
+            <a:solidFill>
+              <a:schemeClr val="accent3"/>
+            </a:solidFill>
+          </a:ln>
+          <a:effectLst/>
+        </p:spPr>
+        <p:style>
+          <a:lnRef idx="1">
+            <a:schemeClr val="accent3"/>
+          </a:lnRef>
+          <a:fillRef idx="2">
+            <a:schemeClr val="accent3"/>
+          </a:fillRef>
+          <a:effectRef idx="1">
+            <a:schemeClr val="accent3"/>
+          </a:effectRef>
+          <a:fontRef idx="minor">
+            <a:schemeClr val="dk1"/>
+          </a:fontRef>
+        </p:style>
+        <p:txBody>
+          <a:bodyPr rtlCol="0" anchor="ctr"/>
+          <a:lstStyle/>
+          <a:p>
+            <a:pPr algn="ctr"/>
+            <a:r>
+              <a:rPr lang="en-US" sz="1000" b="1" dirty="0" err="1" smtClean="0">
+                <a:solidFill>
+                  <a:schemeClr val="accent3">
+                    <a:lumMod val="75000"/>
+                  </a:schemeClr>
+                </a:solidFill>
+              </a:rPr>
+              <a:t>ReminderList</a:t>
+            </a:r>
+            <a:endParaRPr lang="en-SG" sz="1000" b="1" dirty="0">
+              <a:solidFill>
+                <a:schemeClr val="accent3">
+                  <a:lumMod val="75000"/>
+                </a:schemeClr>
+              </a:solidFill>
+            </a:endParaRPr>
+          </a:p>
+        </p:txBody>
+      </p:sp>
+      <p:cxnSp>
+        <p:nvCxnSpPr>
+          <p:cNvPr id="54" name="Elbow Connector 53"/>
+          <p:cNvCxnSpPr/>
+          <p:nvPr/>
+        </p:nvCxnSpPr>
+        <p:spPr>
+          <a:xfrm rot="16200000" flipH="1">
+            <a:off x="3753531" y="3834743"/>
+            <a:ext cx="144635" cy="703583"/>
+          </a:xfrm>
+          <a:prstGeom prst="bentConnector2">
+            <a:avLst/>
+          </a:prstGeom>
+          <a:ln w="19050">
+            <a:solidFill>
+              <a:schemeClr val="accent3"/>
+            </a:solidFill>
+            <a:headEnd type="none" w="med" len="med"/>
+            <a:tailEnd type="arrow" w="med" len="med"/>
+          </a:ln>
+          <a:effectLst/>
+        </p:spPr>
+        <p:style>
+          <a:lnRef idx="1">
+            <a:schemeClr val="accent2"/>
+          </a:lnRef>
+          <a:fillRef idx="2">
+            <a:schemeClr val="accent2"/>
+          </a:fillRef>
+          <a:effectRef idx="1">
+            <a:schemeClr val="accent2"/>
+          </a:effectRef>
+          <a:fontRef idx="minor">
+            <a:schemeClr val="dk1"/>
+          </a:fontRef>
+        </p:style>
+      </p:cxnSp>
+      <p:sp>
+        <p:nvSpPr>
+          <p:cNvPr id="55" name="Rectangle 11"/>
+          <p:cNvSpPr/>
+          <p:nvPr/>
+        </p:nvSpPr>
+        <p:spPr>
+          <a:xfrm>
+            <a:off x="5139840" y="3504523"/>
+            <a:ext cx="957043" cy="285461"/>
+          </a:xfrm>
+          <a:prstGeom prst="rect">
+            <a:avLst/>
+          </a:prstGeom>
+          <a:ln w="19050">
+            <a:solidFill>
+              <a:schemeClr val="accent3"/>
+            </a:solidFill>
+          </a:ln>
+          <a:effectLst/>
+        </p:spPr>
+        <p:style>
+          <a:lnRef idx="1">
+            <a:schemeClr val="accent3"/>
+          </a:lnRef>
+          <a:fillRef idx="2">
+            <a:schemeClr val="accent3"/>
+          </a:fillRef>
+          <a:effectRef idx="1">
+            <a:schemeClr val="accent3"/>
+          </a:effectRef>
+          <a:fontRef idx="minor">
+            <a:schemeClr val="dk1"/>
+          </a:fontRef>
+        </p:style>
+        <p:txBody>
+          <a:bodyPr rtlCol="0" anchor="ctr"/>
+          <a:lstStyle/>
+          <a:p>
+            <a:pPr algn="ctr"/>
+            <a:r>
+              <a:rPr lang="en-US" sz="1000" b="1" dirty="0" err="1" smtClean="0">
+                <a:solidFill>
+                  <a:schemeClr val="accent3">
+                    <a:lumMod val="75000"/>
+                  </a:schemeClr>
+                </a:solidFill>
+              </a:rPr>
+              <a:t>ReminderCard</a:t>
+            </a:r>
+            <a:endParaRPr lang="en-SG" sz="1000" b="1" dirty="0">
+              <a:solidFill>
+                <a:schemeClr val="accent3">
+                  <a:lumMod val="75000"/>
+                </a:schemeClr>
+              </a:solidFill>
+            </a:endParaRPr>
+          </a:p>
+        </p:txBody>
+      </p:sp>
+      <p:cxnSp>
+        <p:nvCxnSpPr>
+          <p:cNvPr id="56" name="Elbow Connector 55"/>
+          <p:cNvCxnSpPr/>
+          <p:nvPr/>
+        </p:nvCxnSpPr>
+        <p:spPr>
+          <a:xfrm>
+            <a:off x="3352800" y="3581400"/>
+            <a:ext cx="778395" cy="129021"/>
+          </a:xfrm>
+          <a:prstGeom prst="bentConnector3">
+            <a:avLst>
+              <a:gd name="adj1" fmla="val 907"/>
+            </a:avLst>
+          </a:prstGeom>
+          <a:ln w="19050">
+            <a:solidFill>
+              <a:schemeClr val="accent3"/>
+            </a:solidFill>
+            <a:headEnd type="none" w="med" len="med"/>
+            <a:tailEnd type="arrow" w="med" len="med"/>
+          </a:ln>
+          <a:effectLst/>
+        </p:spPr>
+        <p:style>
+          <a:lnRef idx="1">
+            <a:schemeClr val="accent2"/>
+          </a:lnRef>
+          <a:fillRef idx="2">
+            <a:schemeClr val="accent2"/>
+          </a:fillRef>
+          <a:effectRef idx="1">
+            <a:schemeClr val="accent2"/>
+          </a:effectRef>
+          <a:fontRef idx="minor">
+            <a:schemeClr val="dk1"/>
+          </a:fontRef>
+        </p:style>
+      </p:cxnSp>
+      <p:cxnSp>
+        <p:nvCxnSpPr>
+          <p:cNvPr id="62" name="Elbow Connector 63"/>
+          <p:cNvCxnSpPr>
+            <a:stCxn id="16" idx="3"/>
+          </p:cNvCxnSpPr>
+          <p:nvPr/>
+        </p:nvCxnSpPr>
+        <p:spPr>
+          <a:xfrm rot="5400000">
+            <a:off x="5098507" y="2623492"/>
+            <a:ext cx="2085310" cy="88555"/>
+          </a:xfrm>
+          <a:prstGeom prst="bentConnector3">
+            <a:avLst>
+              <a:gd name="adj1" fmla="val 97776"/>
+            </a:avLst>
+          </a:prstGeom>
+          <a:ln w="6350">
+            <a:solidFill>
+              <a:schemeClr val="accent3"/>
+            </a:solidFill>
+            <a:headEnd type="none" w="med" len="med"/>
+            <a:tailEnd type="none" w="med" len="med"/>
+          </a:ln>
+          <a:effectLst/>
+        </p:spPr>
+        <p:style>
+          <a:lnRef idx="1">
+            <a:schemeClr val="accent2"/>
+          </a:lnRef>
+          <a:fillRef idx="2">
+            <a:schemeClr val="accent2"/>
+          </a:fillRef>
+          <a:effectRef idx="1">
+            <a:schemeClr val="accent2"/>
+          </a:effectRef>
+          <a:fontRef idx="minor">
+            <a:schemeClr val="dk1"/>
+          </a:fontRef>
+        </p:style>
+      </p:cxnSp>
+      <p:cxnSp>
+        <p:nvCxnSpPr>
+          <p:cNvPr id="66" name="Straight Arrow Connector 65"/>
+          <p:cNvCxnSpPr>
+            <a:endCxn id="55" idx="1"/>
+          </p:cNvCxnSpPr>
+          <p:nvPr/>
+        </p:nvCxnSpPr>
+        <p:spPr>
+          <a:xfrm flipV="1">
+            <a:off x="5029200" y="3647254"/>
+            <a:ext cx="110640" cy="19048"/>
+          </a:xfrm>
+          <a:prstGeom prst="straightConnector1">
+            <a:avLst/>
+          </a:prstGeom>
+          <a:ln w="19050">
+            <a:solidFill>
+              <a:srgbClr val="00B050"/>
+            </a:solidFill>
+            <a:headEnd type="none" w="med" len="med"/>
+            <a:tailEnd type="arrow" w="med" len="med"/>
+          </a:ln>
+          <a:effectLst/>
+        </p:spPr>
+        <p:style>
+          <a:lnRef idx="1">
+            <a:schemeClr val="accent2"/>
+          </a:lnRef>
+          <a:fillRef idx="2">
+            <a:schemeClr val="accent2"/>
+          </a:fillRef>
+          <a:effectRef idx="1">
+            <a:schemeClr val="accent2"/>
+          </a:effectRef>
+          <a:fontRef idx="minor">
+            <a:schemeClr val="dk1"/>
+          </a:fontRef>
+        </p:style>
+      </p:cxnSp>
+      <p:sp>
+        <p:nvSpPr>
+          <p:cNvPr id="70" name="Freeform 69"/>
+          <p:cNvSpPr/>
+          <p:nvPr/>
+        </p:nvSpPr>
+        <p:spPr>
+          <a:xfrm flipV="1">
+            <a:off x="5371567" y="3810000"/>
+            <a:ext cx="2181172" cy="65861"/>
+          </a:xfrm>
+          <a:custGeom>
+            <a:avLst/>
+            <a:gdLst>
+              <a:gd name="connsiteX0" fmla="*/ 0 w 3048000"/>
+              <a:gd name="connsiteY0" fmla="*/ 203200 h 203200"/>
+              <a:gd name="connsiteX1" fmla="*/ 221673 w 3048000"/>
+              <a:gd name="connsiteY1" fmla="*/ 0 h 203200"/>
+              <a:gd name="connsiteX2" fmla="*/ 3048000 w 3048000"/>
+              <a:gd name="connsiteY2" fmla="*/ 0 h 203200"/>
+            </a:gdLst>
+            <a:ahLst/>
+            <a:cxnLst>
+              <a:cxn ang="0">
+                <a:pos x="connsiteX0" y="connsiteY0"/>
+              </a:cxn>
+              <a:cxn ang="0">
+                <a:pos x="connsiteX1" y="connsiteY1"/>
+              </a:cxn>
+              <a:cxn ang="0">
+                <a:pos x="connsiteX2" y="connsiteY2"/>
+              </a:cxn>
+            </a:cxnLst>
+            <a:rect l="l" t="t" r="r" b="b"/>
+            <a:pathLst>
+              <a:path w="3048000" h="203200">
+                <a:moveTo>
+                  <a:pt x="0" y="203200"/>
+                </a:moveTo>
+                <a:lnTo>
+                  <a:pt x="221673" y="0"/>
+                </a:lnTo>
+                <a:lnTo>
+                  <a:pt x="3048000" y="0"/>
+                </a:lnTo>
+              </a:path>
+            </a:pathLst>
+          </a:custGeom>
+          <a:noFill/>
+          <a:ln w="19050">
+            <a:solidFill>
+              <a:schemeClr val="accent3"/>
+            </a:solidFill>
+            <a:prstDash val="sysDot"/>
+            <a:headEnd type="none" w="med" len="med"/>
+            <a:tailEnd type="arrow" w="med" len="med"/>
+          </a:ln>
+          <a:effectLst/>
+        </p:spPr>
+        <p:style>
+          <a:lnRef idx="1">
+            <a:schemeClr val="accent2"/>
+          </a:lnRef>
+          <a:fillRef idx="2">
+            <a:schemeClr val="accent2"/>
+          </a:fillRef>
+          <a:effectRef idx="1">
+            <a:schemeClr val="accent2"/>
+          </a:effectRef>
+          <a:fontRef idx="minor">
+            <a:schemeClr val="dk1"/>
+          </a:fontRef>
+        </p:style>
+        <p:txBody>
+          <a:bodyPr rtlCol="0" anchor="ctr"/>
+          <a:lstStyle/>
+          <a:p>
+            <a:pPr algn="ctr"/>
+            <a:endParaRPr lang="en-SG" dirty="0"/>
+          </a:p>
+        </p:txBody>
+      </p:sp>
     </p:spTree>
     <p:extLst>
       <p:ext uri="{BB962C8B-B14F-4D97-AF65-F5344CB8AC3E}">
@@ -9810,6 +10132,13 @@
   <p:clrMapOvr>
     <a:masterClrMapping/>
   </p:clrMapOvr>
+  <p:timing>
+    <p:tnLst>
+      <p:par>
+        <p:cTn id="1" dur="indefinite" restart="never" nodeType="tmRoot"/>
+      </p:par>
+    </p:tnLst>
+  </p:timing>
 </p:sld>
 </file>
 
@@ -11607,6 +11936,13 @@
   <p:clrMapOvr>
     <a:masterClrMapping/>
   </p:clrMapOvr>
+  <p:timing>
+    <p:tnLst>
+      <p:par>
+        <p:cTn id="1" dur="indefinite" restart="never" nodeType="tmRoot"/>
+      </p:par>
+    </p:tnLst>
+  </p:timing>
 </p:sld>
 </file>
 
@@ -13302,7 +13638,7 @@
         </p:nvGrpSpPr>
         <p:grpSpPr>
           <a:xfrm>
-            <a:off x="910091" y="1727200"/>
+            <a:off x="914400" y="1752600"/>
             <a:ext cx="7700509" cy="2997200"/>
             <a:chOff x="910091" y="1727200"/>
             <a:chExt cx="7700509" cy="2997200"/>
@@ -13498,8 +13834,8 @@
           </p:nvCxnSpPr>
           <p:spPr>
             <a:xfrm flipV="1">
-              <a:off x="6477000" y="3204826"/>
-              <a:ext cx="190770" cy="405819"/>
+              <a:off x="6477000" y="3352800"/>
+              <a:ext cx="190770" cy="257845"/>
             </a:xfrm>
             <a:prstGeom prst="bentConnector2">
               <a:avLst/>
@@ -13694,15 +14030,14 @@
           <p:nvCxnSpPr>
             <p:cNvPr id="55" name="Straight Arrow Connector 54"/>
             <p:cNvCxnSpPr>
-              <a:stCxn id="62" idx="0"/>
               <a:endCxn id="67" idx="2"/>
             </p:cNvCxnSpPr>
             <p:nvPr/>
           </p:nvCxnSpPr>
           <p:spPr>
-            <a:xfrm flipV="1">
-              <a:off x="6667770" y="2632344"/>
-              <a:ext cx="1612" cy="225722"/>
+            <a:xfrm flipH="1" flipV="1">
+              <a:off x="6445784" y="2861360"/>
+              <a:ext cx="20293" cy="144680"/>
             </a:xfrm>
             <a:prstGeom prst="straightConnector1">
               <a:avLst/>
@@ -14103,7 +14438,7 @@
           </p:nvSpPr>
           <p:spPr>
             <a:xfrm>
-              <a:off x="4487017" y="2847371"/>
+              <a:off x="4487017" y="3006040"/>
               <a:ext cx="1156969" cy="346760"/>
             </a:xfrm>
             <a:prstGeom prst="rect">
@@ -14210,7 +14545,7 @@
           <p:spPr>
             <a:xfrm>
               <a:off x="4220351" y="2760681"/>
-              <a:ext cx="266666" cy="260070"/>
+              <a:ext cx="266666" cy="418739"/>
             </a:xfrm>
             <a:prstGeom prst="bentConnector3">
               <a:avLst/>
@@ -14247,7 +14582,7 @@
           </p:nvSpPr>
           <p:spPr>
             <a:xfrm>
-              <a:off x="4503204" y="2280569"/>
+              <a:off x="4503204" y="2514600"/>
               <a:ext cx="1156969" cy="346760"/>
             </a:xfrm>
             <a:prstGeom prst="rect">
@@ -14306,8 +14641,8 @@
           </p:nvCxnSpPr>
           <p:spPr>
             <a:xfrm flipV="1">
-              <a:off x="4220351" y="2453949"/>
-              <a:ext cx="282853" cy="306732"/>
+              <a:off x="4220351" y="2687980"/>
+              <a:ext cx="282853" cy="72701"/>
             </a:xfrm>
             <a:prstGeom prst="bentConnector3">
               <a:avLst>
@@ -14346,7 +14681,7 @@
           </p:nvSpPr>
           <p:spPr>
             <a:xfrm>
-              <a:off x="6313677" y="2858066"/>
+              <a:off x="6313677" y="3006040"/>
               <a:ext cx="708186" cy="346760"/>
             </a:xfrm>
             <a:prstGeom prst="rect">
@@ -14402,7 +14737,7 @@
           </p:nvSpPr>
           <p:spPr>
             <a:xfrm>
-              <a:off x="5643227" y="2943979"/>
+              <a:off x="5631352" y="3103220"/>
               <a:ext cx="236048" cy="173380"/>
             </a:xfrm>
             <a:prstGeom prst="flowChartDecision">
@@ -14449,9 +14784,9 @@
             <p:nvPr/>
           </p:nvCxnSpPr>
           <p:spPr>
-            <a:xfrm>
-              <a:off x="5879275" y="3030669"/>
-              <a:ext cx="434402" cy="777"/>
+            <a:xfrm flipV="1">
+              <a:off x="5867400" y="3179420"/>
+              <a:ext cx="446277" cy="10490"/>
             </a:xfrm>
             <a:prstGeom prst="bentConnector3">
               <a:avLst/>
@@ -14488,7 +14823,7 @@
           </p:nvSpPr>
           <p:spPr>
             <a:xfrm>
-              <a:off x="6315289" y="2285584"/>
+              <a:off x="6091691" y="2514600"/>
               <a:ext cx="708186" cy="346760"/>
             </a:xfrm>
             <a:prstGeom prst="rect">
@@ -14544,7 +14879,7 @@
           </p:nvSpPr>
           <p:spPr>
             <a:xfrm>
-              <a:off x="5672547" y="2371497"/>
+              <a:off x="5672547" y="2590800"/>
               <a:ext cx="236048" cy="173380"/>
             </a:xfrm>
             <a:prstGeom prst="flowChartDecision">
@@ -14592,8 +14927,8 @@
           </p:nvCxnSpPr>
           <p:spPr>
             <a:xfrm>
-              <a:off x="5908595" y="2458187"/>
-              <a:ext cx="406694" cy="777"/>
+              <a:off x="5908595" y="2677490"/>
+              <a:ext cx="183096" cy="10490"/>
             </a:xfrm>
             <a:prstGeom prst="bentConnector3">
               <a:avLst/>
@@ -15298,7 +15633,7 @@
           </p:nvSpPr>
           <p:spPr>
             <a:xfrm rot="16200000">
-              <a:off x="6581354" y="3514530"/>
+              <a:off x="6581354" y="3670486"/>
               <a:ext cx="881018" cy="261610"/>
             </a:xfrm>
             <a:prstGeom prst="rect">
@@ -15568,6 +15903,282 @@
           </p:txBody>
         </p:sp>
       </p:grpSp>
+      <p:cxnSp>
+        <p:nvCxnSpPr>
+          <p:cNvPr id="66" name="Elbow Connector 65"/>
+          <p:cNvCxnSpPr/>
+          <p:nvPr/>
+        </p:nvCxnSpPr>
+        <p:spPr>
+          <a:xfrm rot="5400000" flipH="1" flipV="1">
+            <a:off x="4086377" y="2555872"/>
+            <a:ext cx="654044" cy="94618"/>
+          </a:xfrm>
+          <a:prstGeom prst="bentConnector3">
+            <a:avLst>
+              <a:gd name="adj1" fmla="val 100080"/>
+            </a:avLst>
+          </a:prstGeom>
+          <a:ln w="19050">
+            <a:solidFill>
+              <a:srgbClr val="7030A0"/>
+            </a:solidFill>
+            <a:headEnd type="none" w="med" len="med"/>
+            <a:tailEnd type="arrow" w="med" len="med"/>
+          </a:ln>
+          <a:effectLst/>
+        </p:spPr>
+        <p:style>
+          <a:lnRef idx="1">
+            <a:schemeClr val="accent2"/>
+          </a:lnRef>
+          <a:fillRef idx="2">
+            <a:schemeClr val="accent2"/>
+          </a:fillRef>
+          <a:effectRef idx="1">
+            <a:schemeClr val="accent2"/>
+          </a:effectRef>
+          <a:fontRef idx="minor">
+            <a:schemeClr val="dk1"/>
+          </a:fontRef>
+        </p:style>
+      </p:cxnSp>
+      <p:sp>
+        <p:nvSpPr>
+          <p:cNvPr id="70" name="Rectangle 8"/>
+          <p:cNvSpPr/>
+          <p:nvPr/>
+        </p:nvSpPr>
+        <p:spPr>
+          <a:xfrm>
+            <a:off x="4481831" y="2091163"/>
+            <a:ext cx="1156969" cy="346760"/>
+          </a:xfrm>
+          <a:prstGeom prst="rect">
+            <a:avLst/>
+          </a:prstGeom>
+          <a:ln w="19050">
+            <a:solidFill>
+              <a:srgbClr val="7030A0"/>
+            </a:solidFill>
+          </a:ln>
+          <a:effectLst/>
+        </p:spPr>
+        <p:style>
+          <a:lnRef idx="1">
+            <a:schemeClr val="accent4"/>
+          </a:lnRef>
+          <a:fillRef idx="2">
+            <a:schemeClr val="accent4"/>
+          </a:fillRef>
+          <a:effectRef idx="1">
+            <a:schemeClr val="accent4"/>
+          </a:effectRef>
+          <a:fontRef idx="minor">
+            <a:schemeClr val="dk1"/>
+          </a:fontRef>
+        </p:style>
+        <p:txBody>
+          <a:bodyPr rtlCol="0" anchor="ctr"/>
+          <a:lstStyle/>
+          <a:p>
+            <a:pPr algn="ctr"/>
+            <a:r>
+              <a:rPr lang="en-US" sz="1050" dirty="0" err="1" smtClean="0">
+                <a:solidFill>
+                  <a:srgbClr val="7030A0"/>
+                </a:solidFill>
+              </a:rPr>
+              <a:t>UniqueReminderList</a:t>
+            </a:r>
+            <a:endParaRPr lang="en-SG" sz="1050" dirty="0">
+              <a:solidFill>
+                <a:srgbClr val="7030A0"/>
+              </a:solidFill>
+            </a:endParaRPr>
+          </a:p>
+        </p:txBody>
+      </p:sp>
+      <p:sp>
+        <p:nvSpPr>
+          <p:cNvPr id="77" name="Flowchart: Decision 96"/>
+          <p:cNvSpPr/>
+          <p:nvPr/>
+        </p:nvSpPr>
+        <p:spPr>
+          <a:xfrm>
+            <a:off x="5638800" y="2188820"/>
+            <a:ext cx="236048" cy="173380"/>
+          </a:xfrm>
+          <a:prstGeom prst="flowChartDecision">
+            <a:avLst/>
+          </a:prstGeom>
+          <a:noFill/>
+          <a:ln w="19050">
+            <a:solidFill>
+              <a:srgbClr val="7030A0"/>
+            </a:solidFill>
+          </a:ln>
+          <a:effectLst/>
+        </p:spPr>
+        <p:style>
+          <a:lnRef idx="1">
+            <a:schemeClr val="accent6"/>
+          </a:lnRef>
+          <a:fillRef idx="2">
+            <a:schemeClr val="accent6"/>
+          </a:fillRef>
+          <a:effectRef idx="1">
+            <a:schemeClr val="accent6"/>
+          </a:effectRef>
+          <a:fontRef idx="minor">
+            <a:schemeClr val="dk1"/>
+          </a:fontRef>
+        </p:style>
+        <p:txBody>
+          <a:bodyPr rtlCol="0" anchor="ctr"/>
+          <a:lstStyle/>
+          <a:p>
+            <a:pPr algn="ctr"/>
+            <a:endParaRPr lang="en-US" sz="1050"/>
+          </a:p>
+        </p:txBody>
+      </p:sp>
+      <p:cxnSp>
+        <p:nvCxnSpPr>
+          <p:cNvPr id="82" name="Elbow Connector 81"/>
+          <p:cNvCxnSpPr>
+            <a:stCxn id="77" idx="3"/>
+          </p:cNvCxnSpPr>
+          <p:nvPr/>
+        </p:nvCxnSpPr>
+        <p:spPr>
+          <a:xfrm>
+            <a:off x="5874848" y="2275510"/>
+            <a:ext cx="406694" cy="10490"/>
+          </a:xfrm>
+          <a:prstGeom prst="bentConnector3">
+            <a:avLst/>
+          </a:prstGeom>
+          <a:ln w="19050">
+            <a:solidFill>
+              <a:srgbClr val="7030A0"/>
+            </a:solidFill>
+            <a:headEnd type="none" w="med" len="med"/>
+            <a:tailEnd type="arrow" w="med" len="med"/>
+          </a:ln>
+          <a:effectLst/>
+        </p:spPr>
+        <p:style>
+          <a:lnRef idx="1">
+            <a:schemeClr val="accent2"/>
+          </a:lnRef>
+          <a:fillRef idx="2">
+            <a:schemeClr val="accent2"/>
+          </a:fillRef>
+          <a:effectRef idx="1">
+            <a:schemeClr val="accent2"/>
+          </a:effectRef>
+          <a:fontRef idx="minor">
+            <a:schemeClr val="dk1"/>
+          </a:fontRef>
+        </p:style>
+      </p:cxnSp>
+      <p:sp>
+        <p:nvSpPr>
+          <p:cNvPr id="87" name="Rectangle 8"/>
+          <p:cNvSpPr/>
+          <p:nvPr/>
+        </p:nvSpPr>
+        <p:spPr>
+          <a:xfrm>
+            <a:off x="6248400" y="2091640"/>
+            <a:ext cx="744042" cy="346760"/>
+          </a:xfrm>
+          <a:prstGeom prst="rect">
+            <a:avLst/>
+          </a:prstGeom>
+          <a:ln w="19050">
+            <a:solidFill>
+              <a:srgbClr val="7030A0"/>
+            </a:solidFill>
+          </a:ln>
+          <a:effectLst/>
+        </p:spPr>
+        <p:style>
+          <a:lnRef idx="1">
+            <a:schemeClr val="accent4"/>
+          </a:lnRef>
+          <a:fillRef idx="2">
+            <a:schemeClr val="accent4"/>
+          </a:fillRef>
+          <a:effectRef idx="1">
+            <a:schemeClr val="accent4"/>
+          </a:effectRef>
+          <a:fontRef idx="minor">
+            <a:schemeClr val="dk1"/>
+          </a:fontRef>
+        </p:style>
+        <p:txBody>
+          <a:bodyPr rtlCol="0" anchor="ctr"/>
+          <a:lstStyle/>
+          <a:p>
+            <a:pPr algn="ctr"/>
+            <a:r>
+              <a:rPr lang="en-US" sz="1050" dirty="0" smtClean="0">
+                <a:solidFill>
+                  <a:srgbClr val="7030A0"/>
+                </a:solidFill>
+              </a:rPr>
+              <a:t>Reminder</a:t>
+            </a:r>
+            <a:endParaRPr lang="en-SG" sz="1050" dirty="0">
+              <a:solidFill>
+                <a:srgbClr val="7030A0"/>
+              </a:solidFill>
+            </a:endParaRPr>
+          </a:p>
+        </p:txBody>
+      </p:sp>
+      <p:cxnSp>
+        <p:nvCxnSpPr>
+          <p:cNvPr id="89" name="Straight Arrow Connector 88"/>
+          <p:cNvCxnSpPr/>
+          <p:nvPr/>
+        </p:nvCxnSpPr>
+        <p:spPr>
+          <a:xfrm flipV="1">
+            <a:off x="6934200" y="2425990"/>
+            <a:ext cx="2093" cy="619226"/>
+          </a:xfrm>
+          <a:prstGeom prst="straightConnector1">
+            <a:avLst/>
+          </a:prstGeom>
+          <a:ln w="19050">
+            <a:solidFill>
+              <a:srgbClr val="7030A0"/>
+            </a:solidFill>
+            <a:prstDash val="sysDot"/>
+            <a:headEnd type="none" w="med" len="med"/>
+            <a:tailEnd type="arrow" w="med" len="med"/>
+          </a:ln>
+          <a:effectLst/>
+        </p:spPr>
+        <p:style>
+          <a:lnRef idx="1">
+            <a:schemeClr val="accent2"/>
+          </a:lnRef>
+          <a:fillRef idx="2">
+            <a:schemeClr val="accent2"/>
+          </a:fillRef>
+          <a:effectRef idx="1">
+            <a:schemeClr val="accent2"/>
+          </a:effectRef>
+          <a:fontRef idx="minor">
+            <a:schemeClr val="dk1"/>
+          </a:fontRef>
+        </p:style>
+      </p:cxnSp>
     </p:spTree>
     <p:extLst>
       <p:ext uri="{BB962C8B-B14F-4D97-AF65-F5344CB8AC3E}">
@@ -15607,7 +16218,7 @@
         <p:grpSpPr>
           <a:xfrm>
             <a:off x="910091" y="2086382"/>
-            <a:ext cx="8081509" cy="1723618"/>
+            <a:ext cx="8081509" cy="2028418"/>
             <a:chOff x="910091" y="2086382"/>
             <a:chExt cx="8081509" cy="1723618"/>
           </a:xfrm>
@@ -16319,6 +16930,16 @@
                   </a:solidFill>
                 </a:rPr>
                 <a:t>XmlTaskList</a:t>
+              </a:r>
+              <a:r>
+                <a:rPr lang="en-US" sz="1050" b="1" dirty="0">
+                  <a:solidFill>
+                    <a:schemeClr val="accent6">
+                      <a:lumMod val="75000"/>
+                    </a:schemeClr>
+                  </a:solidFill>
+                </a:rPr>
+                <a:t/>
               </a:r>
               <a:br>
                 <a:rPr lang="en-US" sz="1050" b="1" dirty="0">
@@ -16677,6 +17298,14 @@
                 </a:rPr>
                 <a:t>JsonUserPrefs</a:t>
               </a:r>
+              <a:r>
+                <a:rPr lang="en-US" sz="1050" dirty="0">
+                  <a:solidFill>
+                    <a:schemeClr val="bg1"/>
+                  </a:solidFill>
+                </a:rPr>
+                <a:t/>
+              </a:r>
               <a:br>
                 <a:rPr lang="en-US" sz="1050" dirty="0">
                   <a:solidFill>
@@ -16746,6 +17375,16 @@
                 </a:rPr>
                 <a:t>XmlSerializable</a:t>
               </a:r>
+              <a:r>
+                <a:rPr lang="en-US" sz="1050" b="1" dirty="0">
+                  <a:solidFill>
+                    <a:schemeClr val="accent6">
+                      <a:lumMod val="75000"/>
+                    </a:schemeClr>
+                  </a:solidFill>
+                </a:rPr>
+                <a:t/>
+              </a:r>
               <a:br>
                 <a:rPr lang="en-US" sz="1050" b="1" dirty="0">
                   <a:solidFill>
@@ -16778,16 +17417,13 @@
         <p:cxnSp>
           <p:nvCxnSpPr>
             <p:cNvPr id="70" name="Elbow Connector 122"/>
-            <p:cNvCxnSpPr>
-              <a:stCxn id="74" idx="0"/>
-              <a:endCxn id="73" idx="2"/>
-            </p:cNvCxnSpPr>
+            <p:cNvCxnSpPr/>
             <p:nvPr/>
           </p:nvCxnSpPr>
           <p:spPr>
             <a:xfrm rot="5400000" flipH="1" flipV="1">
-              <a:off x="8077993" y="2992020"/>
-              <a:ext cx="335208" cy="12700"/>
+              <a:off x="7951538" y="2875212"/>
+              <a:ext cx="568824" cy="12700"/>
             </a:xfrm>
             <a:prstGeom prst="bentConnector3">
               <a:avLst>
@@ -16824,7 +17460,7 @@
           </p:nvSpPr>
           <p:spPr>
             <a:xfrm>
-              <a:off x="7615738" y="2477656"/>
+              <a:off x="7615738" y="2244040"/>
               <a:ext cx="1259718" cy="346760"/>
             </a:xfrm>
             <a:prstGeom prst="rect">
@@ -16880,7 +17516,7 @@
           </p:nvSpPr>
           <p:spPr>
             <a:xfrm>
-              <a:off x="7615738" y="3159624"/>
+              <a:off x="7615738" y="2819400"/>
               <a:ext cx="1259718" cy="346760"/>
             </a:xfrm>
             <a:prstGeom prst="rect">
@@ -16933,14 +17569,13 @@
             <p:cNvPr id="77" name="Elbow Connector 122"/>
             <p:cNvCxnSpPr>
               <a:stCxn id="66" idx="3"/>
-              <a:endCxn id="74" idx="1"/>
             </p:cNvCxnSpPr>
             <p:nvPr/>
           </p:nvCxnSpPr>
           <p:spPr>
             <a:xfrm flipV="1">
-              <a:off x="7220507" y="3333004"/>
-              <a:ext cx="395231" cy="786"/>
+              <a:off x="7220507" y="3040052"/>
+              <a:ext cx="390264" cy="293738"/>
             </a:xfrm>
             <a:prstGeom prst="bentConnector3">
               <a:avLst>
@@ -16970,6 +17605,100 @@
           </p:style>
         </p:cxnSp>
       </p:grpSp>
+      <p:cxnSp>
+        <p:nvCxnSpPr>
+          <p:cNvPr id="27" name="Elbow Connector 122"/>
+          <p:cNvCxnSpPr/>
+          <p:nvPr/>
+        </p:nvCxnSpPr>
+        <p:spPr>
+          <a:xfrm rot="16200000" flipH="1">
+            <a:off x="8109947" y="3485154"/>
+            <a:ext cx="264709" cy="2"/>
+          </a:xfrm>
+          <a:prstGeom prst="bentConnector3">
+            <a:avLst>
+              <a:gd name="adj1" fmla="val 50000"/>
+            </a:avLst>
+          </a:prstGeom>
+          <a:ln w="19050">
+            <a:prstDash val="sysDot"/>
+            <a:headEnd type="none" w="med" len="med"/>
+            <a:tailEnd type="arrow" w="med" len="med"/>
+          </a:ln>
+          <a:effectLst/>
+        </p:spPr>
+        <p:style>
+          <a:lnRef idx="1">
+            <a:schemeClr val="accent6"/>
+          </a:lnRef>
+          <a:fillRef idx="2">
+            <a:schemeClr val="accent6"/>
+          </a:fillRef>
+          <a:effectRef idx="1">
+            <a:schemeClr val="accent6"/>
+          </a:effectRef>
+          <a:fontRef idx="minor">
+            <a:schemeClr val="dk1"/>
+          </a:fontRef>
+        </p:style>
+      </p:cxnSp>
+      <p:sp>
+        <p:nvSpPr>
+          <p:cNvPr id="30" name="Rectangle 8"/>
+          <p:cNvSpPr/>
+          <p:nvPr/>
+        </p:nvSpPr>
+        <p:spPr>
+          <a:xfrm>
+            <a:off x="7431344" y="3615640"/>
+            <a:ext cx="1484056" cy="346760"/>
+          </a:xfrm>
+          <a:prstGeom prst="rect">
+            <a:avLst/>
+          </a:prstGeom>
+          <a:ln w="19050"/>
+          <a:effectLst/>
+        </p:spPr>
+        <p:style>
+          <a:lnRef idx="1">
+            <a:schemeClr val="accent6"/>
+          </a:lnRef>
+          <a:fillRef idx="2">
+            <a:schemeClr val="accent6"/>
+          </a:fillRef>
+          <a:effectRef idx="1">
+            <a:schemeClr val="accent6"/>
+          </a:effectRef>
+          <a:fontRef idx="minor">
+            <a:schemeClr val="dk1"/>
+          </a:fontRef>
+        </p:style>
+        <p:txBody>
+          <a:bodyPr rtlCol="0" anchor="ctr"/>
+          <a:lstStyle/>
+          <a:p>
+            <a:pPr algn="ctr"/>
+            <a:r>
+              <a:rPr lang="en-US" sz="1050" b="1" dirty="0" err="1" smtClean="0">
+                <a:solidFill>
+                  <a:schemeClr val="accent6">
+                    <a:lumMod val="75000"/>
+                  </a:schemeClr>
+                </a:solidFill>
+              </a:rPr>
+              <a:t>XmlAdaptedReminder</a:t>
+            </a:r>
+            <a:endParaRPr lang="en-SG" sz="1050" b="1" dirty="0">
+              <a:solidFill>
+                <a:schemeClr val="accent6">
+                  <a:lumMod val="75000"/>
+                </a:schemeClr>
+              </a:solidFill>
+            </a:endParaRPr>
+          </a:p>
+        </p:txBody>
+      </p:sp>
     </p:spTree>
     <p:extLst>
       <p:ext uri="{BB962C8B-B14F-4D97-AF65-F5344CB8AC3E}">

</xml_diff>